<commit_message>
Aaron 9/25/2023 1: Completed documentation
</commit_message>
<xml_diff>
--- a/Document/figs/Figures.pptx
+++ b/Document/figs/Figures.pptx
@@ -3531,1566 +3531,1591 @@
       <p:grpSpPr/>
       <p:grpSp>
         <p:nvGrpSpPr>
-          <p:cNvPr id="51" name="Group 50"/>
+          <p:cNvPr id="10" name="Group 9"/>
           <p:cNvGrpSpPr/>
           <p:nvPr/>
         </p:nvGrpSpPr>
         <p:grpSpPr>
           <a:xfrm>
             <a:off x="1576070" y="671195"/>
-            <a:ext cx="8477885" cy="5347970"/>
+            <a:ext cx="8557260" cy="5597525"/>
             <a:chOff x="2482" y="1057"/>
-            <a:chExt cx="8184" cy="4290"/>
+            <a:chExt cx="13476" cy="8815"/>
           </a:xfrm>
         </p:grpSpPr>
-        <p:sp>
-          <p:nvSpPr>
-            <p:cNvPr id="45" name="Rectangle 44"/>
-            <p:cNvSpPr/>
+        <p:grpSp>
+          <p:nvGrpSpPr>
+            <p:cNvPr id="51" name="Group 50"/>
+            <p:cNvGrpSpPr/>
             <p:nvPr/>
-          </p:nvSpPr>
-          <p:spPr>
+          </p:nvGrpSpPr>
+          <p:grpSpPr>
             <a:xfrm>
               <a:off x="2482" y="1057"/>
-              <a:ext cx="8184" cy="4290"/>
+              <a:ext cx="13477" cy="8638"/>
+              <a:chOff x="2482" y="1057"/>
+              <a:chExt cx="8261" cy="4400"/>
             </a:xfrm>
-            <a:prstGeom prst="rect">
-              <a:avLst/>
-            </a:prstGeom>
-            <a:solidFill>
-              <a:srgbClr val="2A234A"/>
-            </a:solidFill>
-            <a:ln>
-              <a:noFill/>
-            </a:ln>
-          </p:spPr>
-          <p:style>
-            <a:lnRef idx="2">
-              <a:schemeClr val="accent1">
-                <a:shade val="50000"/>
-              </a:schemeClr>
-            </a:lnRef>
-            <a:fillRef idx="1">
-              <a:schemeClr val="accent1"/>
-            </a:fillRef>
-            <a:effectRef idx="0">
-              <a:schemeClr val="accent1"/>
-            </a:effectRef>
-            <a:fontRef idx="minor">
-              <a:schemeClr val="lt1"/>
-            </a:fontRef>
-          </p:style>
-          <p:txBody>
-            <a:bodyPr rtlCol="0" anchor="ctr"/>
-            <a:p>
-              <a:pPr algn="ctr"/>
-              <a:endParaRPr lang="en-US"/>
-            </a:p>
-          </p:txBody>
-        </p:sp>
-        <p:cxnSp>
-          <p:nvCxnSpPr>
-            <p:cNvPr id="4" name="Straight Connector 3"/>
-            <p:cNvCxnSpPr/>
-            <p:nvPr/>
-          </p:nvCxnSpPr>
-          <p:spPr>
-            <a:xfrm>
-              <a:off x="2727" y="2050"/>
-              <a:ext cx="0" cy="720"/>
-            </a:xfrm>
-            <a:prstGeom prst="line">
-              <a:avLst/>
-            </a:prstGeom>
-            <a:ln w="19050">
+          </p:grpSpPr>
+          <p:sp>
+            <p:nvSpPr>
+              <p:cNvPr id="45" name="Rectangle 44"/>
+              <p:cNvSpPr/>
+              <p:nvPr/>
+            </p:nvSpPr>
+            <p:spPr>
+              <a:xfrm>
+                <a:off x="2482" y="1057"/>
+                <a:ext cx="8261" cy="4400"/>
+              </a:xfrm>
+              <a:prstGeom prst="rect">
+                <a:avLst/>
+              </a:prstGeom>
               <a:solidFill>
-                <a:schemeClr val="bg1">
-                  <a:lumMod val="85000"/>
+                <a:srgbClr val="2A234A"/>
+              </a:solidFill>
+              <a:ln>
+                <a:noFill/>
+              </a:ln>
+            </p:spPr>
+            <p:style>
+              <a:lnRef idx="2">
+                <a:schemeClr val="accent1">
+                  <a:shade val="50000"/>
                 </a:schemeClr>
-              </a:solidFill>
-            </a:ln>
-          </p:spPr>
-          <p:style>
-            <a:lnRef idx="1">
-              <a:schemeClr val="accent1"/>
-            </a:lnRef>
-            <a:fillRef idx="0">
-              <a:schemeClr val="accent1"/>
-            </a:fillRef>
-            <a:effectRef idx="0">
-              <a:schemeClr val="accent1"/>
-            </a:effectRef>
-            <a:fontRef idx="minor">
-              <a:schemeClr val="tx1"/>
-            </a:fontRef>
-          </p:style>
-        </p:cxnSp>
-        <p:cxnSp>
-          <p:nvCxnSpPr>
-            <p:cNvPr id="5" name="Straight Connector 4"/>
-            <p:cNvCxnSpPr/>
-            <p:nvPr/>
-          </p:nvCxnSpPr>
-          <p:spPr>
-            <a:xfrm>
-              <a:off x="2727" y="2770"/>
-              <a:ext cx="1440" cy="0"/>
-            </a:xfrm>
-            <a:prstGeom prst="line">
-              <a:avLst/>
-            </a:prstGeom>
-            <a:ln w="19050">
-              <a:solidFill>
-                <a:schemeClr val="bg1">
-                  <a:lumMod val="85000"/>
-                </a:schemeClr>
-              </a:solidFill>
-            </a:ln>
-          </p:spPr>
-          <p:style>
-            <a:lnRef idx="1">
-              <a:schemeClr val="accent1"/>
-            </a:lnRef>
-            <a:fillRef idx="0">
-              <a:schemeClr val="accent1"/>
-            </a:fillRef>
-            <a:effectRef idx="0">
-              <a:schemeClr val="accent1"/>
-            </a:effectRef>
-            <a:fontRef idx="minor">
-              <a:schemeClr val="tx1"/>
-            </a:fontRef>
-          </p:style>
-        </p:cxnSp>
-        <p:cxnSp>
-          <p:nvCxnSpPr>
-            <p:cNvPr id="6" name="Straight Connector 5"/>
-            <p:cNvCxnSpPr/>
-            <p:nvPr/>
-          </p:nvCxnSpPr>
-          <p:spPr>
-            <a:xfrm>
-              <a:off x="4167" y="2050"/>
-              <a:ext cx="0" cy="720"/>
-            </a:xfrm>
-            <a:prstGeom prst="line">
-              <a:avLst/>
-            </a:prstGeom>
-            <a:ln w="19050">
-              <a:solidFill>
-                <a:schemeClr val="bg1">
-                  <a:lumMod val="85000"/>
-                </a:schemeClr>
-              </a:solidFill>
-            </a:ln>
-          </p:spPr>
-          <p:style>
-            <a:lnRef idx="1">
-              <a:schemeClr val="accent1"/>
-            </a:lnRef>
-            <a:fillRef idx="0">
-              <a:schemeClr val="accent1"/>
-            </a:fillRef>
-            <a:effectRef idx="0">
-              <a:schemeClr val="accent1"/>
-            </a:effectRef>
-            <a:fontRef idx="minor">
-              <a:schemeClr val="tx1"/>
-            </a:fontRef>
-          </p:style>
-        </p:cxnSp>
-        <p:sp>
-          <p:nvSpPr>
-            <p:cNvPr id="7" name="Freeform 6"/>
-            <p:cNvSpPr/>
-            <p:nvPr/>
-          </p:nvSpPr>
-          <p:spPr>
-            <a:xfrm>
-              <a:off x="2730" y="2040"/>
-              <a:ext cx="1432" cy="165"/>
-            </a:xfrm>
-            <a:custGeom>
-              <a:avLst/>
-              <a:gdLst>
-                <a:gd name="connisteX0" fmla="*/ 0 w 909320"/>
-                <a:gd name="connsiteY0" fmla="*/ 61747 h 105080"/>
-                <a:gd name="connisteX1" fmla="*/ 152400 w 909320"/>
-                <a:gd name="connsiteY1" fmla="*/ 14122 h 105080"/>
-                <a:gd name="connisteX2" fmla="*/ 247650 w 909320"/>
-                <a:gd name="connsiteY2" fmla="*/ 104927 h 105080"/>
-                <a:gd name="connisteX3" fmla="*/ 409575 w 909320"/>
-                <a:gd name="connsiteY3" fmla="*/ 33172 h 105080"/>
-                <a:gd name="connisteX4" fmla="*/ 519430 w 909320"/>
-                <a:gd name="connsiteY4" fmla="*/ 71272 h 105080"/>
-                <a:gd name="connisteX5" fmla="*/ 661670 w 909320"/>
-                <a:gd name="connsiteY5" fmla="*/ 152 h 105080"/>
-                <a:gd name="connisteX6" fmla="*/ 762000 w 909320"/>
-                <a:gd name="connsiteY6" fmla="*/ 90322 h 105080"/>
-                <a:gd name="connisteX7" fmla="*/ 876300 w 909320"/>
-                <a:gd name="connsiteY7" fmla="*/ 57302 h 105080"/>
-                <a:gd name="connisteX8" fmla="*/ 909320 w 909320"/>
-                <a:gd name="connsiteY8" fmla="*/ 52222 h 105080"/>
-                <a:gd name="connisteX9" fmla="*/ 1080770 w 909320"/>
-                <a:gd name="connsiteY9" fmla="*/ 76352 h 105080"/>
-              </a:gdLst>
-              <a:ahLst/>
-              <a:cxnLst>
-                <a:cxn ang="0">
-                  <a:pos x="connisteX0" y="connsiteY0"/>
-                </a:cxn>
-                <a:cxn ang="0">
-                  <a:pos x="connisteX1" y="connsiteY1"/>
-                </a:cxn>
-                <a:cxn ang="0">
-                  <a:pos x="connisteX2" y="connsiteY2"/>
-                </a:cxn>
-                <a:cxn ang="0">
-                  <a:pos x="connisteX3" y="connsiteY3"/>
-                </a:cxn>
-                <a:cxn ang="0">
-                  <a:pos x="connisteX4" y="connsiteY4"/>
-                </a:cxn>
-                <a:cxn ang="0">
-                  <a:pos x="connisteX5" y="connsiteY5"/>
-                </a:cxn>
-                <a:cxn ang="0">
-                  <a:pos x="connisteX6" y="connsiteY6"/>
-                </a:cxn>
-                <a:cxn ang="0">
-                  <a:pos x="connisteX7" y="connsiteY7"/>
-                </a:cxn>
-                <a:cxn ang="0">
-                  <a:pos x="connisteX8" y="connsiteY8"/>
-                </a:cxn>
-                <a:cxn ang="0">
-                  <a:pos x="connisteX9" y="connsiteY9"/>
-                </a:cxn>
-              </a:cxnLst>
-              <a:rect l="l" t="t" r="r" b="b"/>
-              <a:pathLst>
-                <a:path w="909320" h="105081">
-                  <a:moveTo>
-                    <a:pt x="0" y="61748"/>
-                  </a:moveTo>
-                  <a:cubicBezTo>
-                    <a:pt x="28575" y="50318"/>
-                    <a:pt x="102870" y="5233"/>
-                    <a:pt x="152400" y="14123"/>
-                  </a:cubicBezTo>
-                  <a:cubicBezTo>
-                    <a:pt x="201930" y="23013"/>
-                    <a:pt x="196215" y="101118"/>
-                    <a:pt x="247650" y="104928"/>
-                  </a:cubicBezTo>
-                  <a:cubicBezTo>
-                    <a:pt x="299085" y="108738"/>
-                    <a:pt x="354965" y="40158"/>
-                    <a:pt x="409575" y="33173"/>
-                  </a:cubicBezTo>
-                  <a:cubicBezTo>
-                    <a:pt x="464185" y="26188"/>
-                    <a:pt x="469265" y="77623"/>
-                    <a:pt x="519430" y="71273"/>
-                  </a:cubicBezTo>
-                  <a:cubicBezTo>
-                    <a:pt x="569595" y="64923"/>
-                    <a:pt x="613410" y="-3657"/>
-                    <a:pt x="661670" y="153"/>
-                  </a:cubicBezTo>
-                  <a:cubicBezTo>
-                    <a:pt x="709930" y="3963"/>
-                    <a:pt x="718820" y="78893"/>
-                    <a:pt x="762000" y="90323"/>
-                  </a:cubicBezTo>
-                  <a:cubicBezTo>
-                    <a:pt x="805180" y="101753"/>
-                    <a:pt x="847090" y="64923"/>
-                    <a:pt x="876300" y="57303"/>
-                  </a:cubicBezTo>
-                  <a:cubicBezTo>
-                    <a:pt x="905510" y="49683"/>
-                    <a:pt x="868680" y="48413"/>
-                    <a:pt x="909320" y="52223"/>
-                  </a:cubicBezTo>
-                </a:path>
-              </a:pathLst>
-            </a:custGeom>
-            <a:noFill/>
-            <a:ln>
-              <a:solidFill>
-                <a:schemeClr val="bg1">
-                  <a:lumMod val="85000"/>
-                </a:schemeClr>
-              </a:solidFill>
-            </a:ln>
-          </p:spPr>
-          <p:style>
-            <a:lnRef idx="2">
-              <a:schemeClr val="accent1">
-                <a:shade val="50000"/>
-              </a:schemeClr>
-            </a:lnRef>
-            <a:fillRef idx="1">
-              <a:schemeClr val="accent1"/>
-            </a:fillRef>
-            <a:effectRef idx="0">
-              <a:schemeClr val="accent1"/>
-            </a:effectRef>
-            <a:fontRef idx="minor">
-              <a:schemeClr val="lt1"/>
-            </a:fontRef>
-          </p:style>
-          <p:txBody>
-            <a:bodyPr rtlCol="0" anchor="ctr"/>
-            <a:p>
-              <a:pPr algn="ctr"/>
-              <a:endParaRPr lang="en-US">
+              </a:lnRef>
+              <a:fillRef idx="1">
+                <a:schemeClr val="accent1"/>
+              </a:fillRef>
+              <a:effectRef idx="0">
+                <a:schemeClr val="accent1"/>
+              </a:effectRef>
+              <a:fontRef idx="minor">
+                <a:schemeClr val="lt1"/>
+              </a:fontRef>
+            </p:style>
+            <p:txBody>
+              <a:bodyPr rtlCol="0" anchor="ctr"/>
+              <a:p>
+                <a:pPr algn="ctr"/>
+                <a:endParaRPr lang="en-US"/>
+              </a:p>
+            </p:txBody>
+          </p:sp>
+          <p:cxnSp>
+            <p:nvCxnSpPr>
+              <p:cNvPr id="4" name="Straight Connector 3"/>
+              <p:cNvCxnSpPr/>
+              <p:nvPr/>
+            </p:nvCxnSpPr>
+            <p:spPr>
+              <a:xfrm>
+                <a:off x="2727" y="2050"/>
+                <a:ext cx="0" cy="720"/>
+              </a:xfrm>
+              <a:prstGeom prst="line">
+                <a:avLst/>
+              </a:prstGeom>
+              <a:ln w="19050">
                 <a:solidFill>
                   <a:schemeClr val="bg1">
                     <a:lumMod val="85000"/>
                   </a:schemeClr>
                 </a:solidFill>
-              </a:endParaRPr>
-            </a:p>
-          </p:txBody>
-        </p:sp>
-        <p:cxnSp>
-          <p:nvCxnSpPr>
-            <p:cNvPr id="8" name="Straight Arrow Connector 7"/>
-            <p:cNvCxnSpPr/>
-            <p:nvPr/>
-          </p:nvCxnSpPr>
-          <p:spPr>
-            <a:xfrm flipV="1">
-              <a:off x="3092" y="2122"/>
-              <a:ext cx="0" cy="648"/>
-            </a:xfrm>
-            <a:prstGeom prst="straightConnector1">
-              <a:avLst/>
-            </a:prstGeom>
-            <a:ln w="57150">
-              <a:solidFill>
-                <a:srgbClr val="00B050"/>
-              </a:solidFill>
-              <a:headEnd type="none" w="med" len="med"/>
-              <a:tailEnd type="triangle" w="med" len="med"/>
-            </a:ln>
-          </p:spPr>
-          <p:style>
-            <a:lnRef idx="1">
-              <a:schemeClr val="accent1"/>
-            </a:lnRef>
-            <a:fillRef idx="0">
-              <a:schemeClr val="accent1"/>
-            </a:fillRef>
-            <a:effectRef idx="0">
-              <a:schemeClr val="accent1"/>
-            </a:effectRef>
-            <a:fontRef idx="minor">
-              <a:schemeClr val="tx1"/>
-            </a:fontRef>
-          </p:style>
-        </p:cxnSp>
-        <p:cxnSp>
-          <p:nvCxnSpPr>
-            <p:cNvPr id="9" name="Straight Connector 8"/>
-            <p:cNvCxnSpPr>
-              <a:stCxn id="7" idx="0"/>
-            </p:cNvCxnSpPr>
-            <p:nvPr/>
-          </p:nvCxnSpPr>
-          <p:spPr>
-            <a:xfrm flipV="1">
-              <a:off x="2730" y="2122"/>
-              <a:ext cx="1433" cy="0"/>
-            </a:xfrm>
-            <a:prstGeom prst="line">
-              <a:avLst/>
-            </a:prstGeom>
-            <a:ln w="12700">
-              <a:solidFill>
-                <a:schemeClr val="bg1">
-                  <a:lumMod val="85000"/>
-                </a:schemeClr>
-              </a:solidFill>
-              <a:prstDash val="dash"/>
-            </a:ln>
-          </p:spPr>
-          <p:style>
-            <a:lnRef idx="1">
-              <a:schemeClr val="accent1"/>
-            </a:lnRef>
-            <a:fillRef idx="0">
-              <a:schemeClr val="accent1"/>
-            </a:fillRef>
-            <a:effectRef idx="0">
-              <a:schemeClr val="accent1"/>
-            </a:effectRef>
-            <a:fontRef idx="minor">
-              <a:schemeClr val="tx1"/>
-            </a:fontRef>
-          </p:style>
-        </p:cxnSp>
-        <p:cxnSp>
-          <p:nvCxnSpPr>
-            <p:cNvPr id="12" name="Straight Connector 11"/>
-            <p:cNvCxnSpPr/>
-            <p:nvPr/>
-          </p:nvCxnSpPr>
-          <p:spPr>
-            <a:xfrm>
-              <a:off x="4524" y="2595"/>
-              <a:ext cx="0" cy="720"/>
-            </a:xfrm>
-            <a:prstGeom prst="line">
-              <a:avLst/>
-            </a:prstGeom>
-            <a:ln w="19050">
-              <a:solidFill>
-                <a:schemeClr val="bg1">
-                  <a:lumMod val="85000"/>
-                </a:schemeClr>
-              </a:solidFill>
-            </a:ln>
-          </p:spPr>
-          <p:style>
-            <a:lnRef idx="1">
-              <a:schemeClr val="accent1"/>
-            </a:lnRef>
-            <a:fillRef idx="0">
-              <a:schemeClr val="accent1"/>
-            </a:fillRef>
-            <a:effectRef idx="0">
-              <a:schemeClr val="accent1"/>
-            </a:effectRef>
-            <a:fontRef idx="minor">
-              <a:schemeClr val="tx1"/>
-            </a:fontRef>
-          </p:style>
-        </p:cxnSp>
-        <p:cxnSp>
-          <p:nvCxnSpPr>
-            <p:cNvPr id="13" name="Straight Connector 12"/>
-            <p:cNvCxnSpPr/>
-            <p:nvPr/>
-          </p:nvCxnSpPr>
-          <p:spPr>
-            <a:xfrm>
-              <a:off x="4524" y="3315"/>
-              <a:ext cx="1440" cy="0"/>
-            </a:xfrm>
-            <a:prstGeom prst="line">
-              <a:avLst/>
-            </a:prstGeom>
-            <a:ln w="19050">
-              <a:solidFill>
-                <a:schemeClr val="bg1">
-                  <a:lumMod val="85000"/>
-                </a:schemeClr>
-              </a:solidFill>
-            </a:ln>
-          </p:spPr>
-          <p:style>
-            <a:lnRef idx="1">
-              <a:schemeClr val="accent1"/>
-            </a:lnRef>
-            <a:fillRef idx="0">
-              <a:schemeClr val="accent1"/>
-            </a:fillRef>
-            <a:effectRef idx="0">
-              <a:schemeClr val="accent1"/>
-            </a:effectRef>
-            <a:fontRef idx="minor">
-              <a:schemeClr val="tx1"/>
-            </a:fontRef>
-          </p:style>
-        </p:cxnSp>
-        <p:cxnSp>
-          <p:nvCxnSpPr>
-            <p:cNvPr id="14" name="Straight Connector 13"/>
-            <p:cNvCxnSpPr/>
-            <p:nvPr/>
-          </p:nvCxnSpPr>
-          <p:spPr>
-            <a:xfrm>
-              <a:off x="5964" y="2595"/>
-              <a:ext cx="0" cy="720"/>
-            </a:xfrm>
-            <a:prstGeom prst="line">
-              <a:avLst/>
-            </a:prstGeom>
-            <a:ln w="19050">
-              <a:solidFill>
-                <a:schemeClr val="bg1">
-                  <a:lumMod val="85000"/>
-                </a:schemeClr>
-              </a:solidFill>
-            </a:ln>
-          </p:spPr>
-          <p:style>
-            <a:lnRef idx="1">
-              <a:schemeClr val="accent1"/>
-            </a:lnRef>
-            <a:fillRef idx="0">
-              <a:schemeClr val="accent1"/>
-            </a:fillRef>
-            <a:effectRef idx="0">
-              <a:schemeClr val="accent1"/>
-            </a:effectRef>
-            <a:fontRef idx="minor">
-              <a:schemeClr val="tx1"/>
-            </a:fontRef>
-          </p:style>
-        </p:cxnSp>
-        <p:sp>
-          <p:nvSpPr>
-            <p:cNvPr id="15" name="Freeform 14"/>
-            <p:cNvSpPr/>
-            <p:nvPr/>
-          </p:nvSpPr>
-          <p:spPr>
-            <a:xfrm>
-              <a:off x="4527" y="2585"/>
-              <a:ext cx="1432" cy="165"/>
-            </a:xfrm>
-            <a:custGeom>
-              <a:avLst/>
-              <a:gdLst>
-                <a:gd name="connisteX0" fmla="*/ 0 w 909320"/>
-                <a:gd name="connsiteY0" fmla="*/ 61747 h 105080"/>
-                <a:gd name="connisteX1" fmla="*/ 152400 w 909320"/>
-                <a:gd name="connsiteY1" fmla="*/ 14122 h 105080"/>
-                <a:gd name="connisteX2" fmla="*/ 247650 w 909320"/>
-                <a:gd name="connsiteY2" fmla="*/ 104927 h 105080"/>
-                <a:gd name="connisteX3" fmla="*/ 409575 w 909320"/>
-                <a:gd name="connsiteY3" fmla="*/ 33172 h 105080"/>
-                <a:gd name="connisteX4" fmla="*/ 519430 w 909320"/>
-                <a:gd name="connsiteY4" fmla="*/ 71272 h 105080"/>
-                <a:gd name="connisteX5" fmla="*/ 661670 w 909320"/>
-                <a:gd name="connsiteY5" fmla="*/ 152 h 105080"/>
-                <a:gd name="connisteX6" fmla="*/ 762000 w 909320"/>
-                <a:gd name="connsiteY6" fmla="*/ 90322 h 105080"/>
-                <a:gd name="connisteX7" fmla="*/ 876300 w 909320"/>
-                <a:gd name="connsiteY7" fmla="*/ 57302 h 105080"/>
-                <a:gd name="connisteX8" fmla="*/ 909320 w 909320"/>
-                <a:gd name="connsiteY8" fmla="*/ 52222 h 105080"/>
-                <a:gd name="connisteX9" fmla="*/ 1080770 w 909320"/>
-                <a:gd name="connsiteY9" fmla="*/ 76352 h 105080"/>
-              </a:gdLst>
-              <a:ahLst/>
-              <a:cxnLst>
-                <a:cxn ang="0">
-                  <a:pos x="connisteX0" y="connsiteY0"/>
-                </a:cxn>
-                <a:cxn ang="0">
-                  <a:pos x="connisteX1" y="connsiteY1"/>
-                </a:cxn>
-                <a:cxn ang="0">
-                  <a:pos x="connisteX2" y="connsiteY2"/>
-                </a:cxn>
-                <a:cxn ang="0">
-                  <a:pos x="connisteX3" y="connsiteY3"/>
-                </a:cxn>
-                <a:cxn ang="0">
-                  <a:pos x="connisteX4" y="connsiteY4"/>
-                </a:cxn>
-                <a:cxn ang="0">
-                  <a:pos x="connisteX5" y="connsiteY5"/>
-                </a:cxn>
-                <a:cxn ang="0">
-                  <a:pos x="connisteX6" y="connsiteY6"/>
-                </a:cxn>
-                <a:cxn ang="0">
-                  <a:pos x="connisteX7" y="connsiteY7"/>
-                </a:cxn>
-                <a:cxn ang="0">
-                  <a:pos x="connisteX8" y="connsiteY8"/>
-                </a:cxn>
-                <a:cxn ang="0">
-                  <a:pos x="connisteX9" y="connsiteY9"/>
-                </a:cxn>
-              </a:cxnLst>
-              <a:rect l="l" t="t" r="r" b="b"/>
-              <a:pathLst>
-                <a:path w="909320" h="105081">
-                  <a:moveTo>
-                    <a:pt x="0" y="61748"/>
-                  </a:moveTo>
-                  <a:cubicBezTo>
-                    <a:pt x="28575" y="50318"/>
-                    <a:pt x="102870" y="5233"/>
-                    <a:pt x="152400" y="14123"/>
-                  </a:cubicBezTo>
-                  <a:cubicBezTo>
-                    <a:pt x="201930" y="23013"/>
-                    <a:pt x="196215" y="101118"/>
-                    <a:pt x="247650" y="104928"/>
-                  </a:cubicBezTo>
-                  <a:cubicBezTo>
-                    <a:pt x="299085" y="108738"/>
-                    <a:pt x="354965" y="40158"/>
-                    <a:pt x="409575" y="33173"/>
-                  </a:cubicBezTo>
-                  <a:cubicBezTo>
-                    <a:pt x="464185" y="26188"/>
-                    <a:pt x="469265" y="77623"/>
-                    <a:pt x="519430" y="71273"/>
-                  </a:cubicBezTo>
-                  <a:cubicBezTo>
-                    <a:pt x="569595" y="64923"/>
-                    <a:pt x="613410" y="-3657"/>
-                    <a:pt x="661670" y="153"/>
-                  </a:cubicBezTo>
-                  <a:cubicBezTo>
-                    <a:pt x="709930" y="3963"/>
-                    <a:pt x="718820" y="78893"/>
-                    <a:pt x="762000" y="90323"/>
-                  </a:cubicBezTo>
-                  <a:cubicBezTo>
-                    <a:pt x="805180" y="101753"/>
-                    <a:pt x="847090" y="64923"/>
-                    <a:pt x="876300" y="57303"/>
-                  </a:cubicBezTo>
-                  <a:cubicBezTo>
-                    <a:pt x="905510" y="49683"/>
-                    <a:pt x="868680" y="48413"/>
-                    <a:pt x="909320" y="52223"/>
-                  </a:cubicBezTo>
-                </a:path>
-              </a:pathLst>
-            </a:custGeom>
-            <a:noFill/>
-            <a:ln>
-              <a:solidFill>
-                <a:schemeClr val="bg1">
-                  <a:lumMod val="85000"/>
-                </a:schemeClr>
-              </a:solidFill>
-            </a:ln>
-          </p:spPr>
-          <p:style>
-            <a:lnRef idx="2">
-              <a:schemeClr val="accent1">
-                <a:shade val="50000"/>
-              </a:schemeClr>
-            </a:lnRef>
-            <a:fillRef idx="1">
-              <a:schemeClr val="accent1"/>
-            </a:fillRef>
-            <a:effectRef idx="0">
-              <a:schemeClr val="accent1"/>
-            </a:effectRef>
-            <a:fontRef idx="minor">
-              <a:schemeClr val="lt1"/>
-            </a:fontRef>
-          </p:style>
-          <p:txBody>
-            <a:bodyPr rtlCol="0" anchor="ctr"/>
-            <a:p>
-              <a:pPr algn="ctr"/>
-              <a:endParaRPr lang="en-US">
+              </a:ln>
+            </p:spPr>
+            <p:style>
+              <a:lnRef idx="1">
+                <a:schemeClr val="accent1"/>
+              </a:lnRef>
+              <a:fillRef idx="0">
+                <a:schemeClr val="accent1"/>
+              </a:fillRef>
+              <a:effectRef idx="0">
+                <a:schemeClr val="accent1"/>
+              </a:effectRef>
+              <a:fontRef idx="minor">
+                <a:schemeClr val="tx1"/>
+              </a:fontRef>
+            </p:style>
+          </p:cxnSp>
+          <p:cxnSp>
+            <p:nvCxnSpPr>
+              <p:cNvPr id="5" name="Straight Connector 4"/>
+              <p:cNvCxnSpPr/>
+              <p:nvPr/>
+            </p:nvCxnSpPr>
+            <p:spPr>
+              <a:xfrm>
+                <a:off x="2727" y="2770"/>
+                <a:ext cx="1440" cy="0"/>
+              </a:xfrm>
+              <a:prstGeom prst="line">
+                <a:avLst/>
+              </a:prstGeom>
+              <a:ln w="19050">
                 <a:solidFill>
                   <a:schemeClr val="bg1">
                     <a:lumMod val="85000"/>
                   </a:schemeClr>
                 </a:solidFill>
-              </a:endParaRPr>
-            </a:p>
-          </p:txBody>
-        </p:sp>
-        <p:cxnSp>
-          <p:nvCxnSpPr>
-            <p:cNvPr id="17" name="Straight Connector 16"/>
-            <p:cNvCxnSpPr>
-              <a:stCxn id="15" idx="0"/>
-            </p:cNvCxnSpPr>
-            <p:nvPr/>
-          </p:nvCxnSpPr>
-          <p:spPr>
-            <a:xfrm flipV="1">
-              <a:off x="4527" y="2667"/>
-              <a:ext cx="1433" cy="0"/>
-            </a:xfrm>
-            <a:prstGeom prst="line">
-              <a:avLst/>
-            </a:prstGeom>
-            <a:ln w="12700">
-              <a:solidFill>
-                <a:schemeClr val="bg1">
-                  <a:lumMod val="85000"/>
-                </a:schemeClr>
-              </a:solidFill>
-              <a:prstDash val="dash"/>
-            </a:ln>
-          </p:spPr>
-          <p:style>
-            <a:lnRef idx="1">
-              <a:schemeClr val="accent1"/>
-            </a:lnRef>
-            <a:fillRef idx="0">
-              <a:schemeClr val="accent1"/>
-            </a:fillRef>
-            <a:effectRef idx="0">
-              <a:schemeClr val="accent1"/>
-            </a:effectRef>
-            <a:fontRef idx="minor">
-              <a:schemeClr val="tx1"/>
-            </a:fontRef>
-          </p:style>
-        </p:cxnSp>
-        <p:cxnSp>
-          <p:nvCxnSpPr>
-            <p:cNvPr id="25" name="Straight Connector 24"/>
-            <p:cNvCxnSpPr/>
-            <p:nvPr/>
-          </p:nvCxnSpPr>
-          <p:spPr>
-            <a:xfrm>
-              <a:off x="8376" y="4152"/>
-              <a:ext cx="0" cy="720"/>
-            </a:xfrm>
-            <a:prstGeom prst="line">
-              <a:avLst/>
-            </a:prstGeom>
-            <a:ln w="19050">
-              <a:solidFill>
-                <a:schemeClr val="bg1">
-                  <a:lumMod val="85000"/>
-                </a:schemeClr>
-              </a:solidFill>
-            </a:ln>
-          </p:spPr>
-          <p:style>
-            <a:lnRef idx="1">
-              <a:schemeClr val="accent1"/>
-            </a:lnRef>
-            <a:fillRef idx="0">
-              <a:schemeClr val="accent1"/>
-            </a:fillRef>
-            <a:effectRef idx="0">
-              <a:schemeClr val="accent1"/>
-            </a:effectRef>
-            <a:fontRef idx="minor">
-              <a:schemeClr val="tx1"/>
-            </a:fontRef>
-          </p:style>
-        </p:cxnSp>
-        <p:cxnSp>
-          <p:nvCxnSpPr>
-            <p:cNvPr id="26" name="Straight Connector 25"/>
-            <p:cNvCxnSpPr/>
-            <p:nvPr/>
-          </p:nvCxnSpPr>
-          <p:spPr>
-            <a:xfrm>
-              <a:off x="8376" y="4872"/>
-              <a:ext cx="1440" cy="0"/>
-            </a:xfrm>
-            <a:prstGeom prst="line">
-              <a:avLst/>
-            </a:prstGeom>
-            <a:ln w="19050">
-              <a:solidFill>
-                <a:schemeClr val="bg1">
-                  <a:lumMod val="85000"/>
-                </a:schemeClr>
-              </a:solidFill>
-            </a:ln>
-          </p:spPr>
-          <p:style>
-            <a:lnRef idx="1">
-              <a:schemeClr val="accent1"/>
-            </a:lnRef>
-            <a:fillRef idx="0">
-              <a:schemeClr val="accent1"/>
-            </a:fillRef>
-            <a:effectRef idx="0">
-              <a:schemeClr val="accent1"/>
-            </a:effectRef>
-            <a:fontRef idx="minor">
-              <a:schemeClr val="tx1"/>
-            </a:fontRef>
-          </p:style>
-        </p:cxnSp>
-        <p:cxnSp>
-          <p:nvCxnSpPr>
-            <p:cNvPr id="27" name="Straight Connector 26"/>
-            <p:cNvCxnSpPr/>
-            <p:nvPr/>
-          </p:nvCxnSpPr>
-          <p:spPr>
-            <a:xfrm>
-              <a:off x="9816" y="4152"/>
-              <a:ext cx="0" cy="720"/>
-            </a:xfrm>
-            <a:prstGeom prst="line">
-              <a:avLst/>
-            </a:prstGeom>
-            <a:ln w="19050">
-              <a:solidFill>
-                <a:schemeClr val="bg1">
-                  <a:lumMod val="85000"/>
-                </a:schemeClr>
-              </a:solidFill>
-            </a:ln>
-          </p:spPr>
-          <p:style>
-            <a:lnRef idx="1">
-              <a:schemeClr val="accent1"/>
-            </a:lnRef>
-            <a:fillRef idx="0">
-              <a:schemeClr val="accent1"/>
-            </a:fillRef>
-            <a:effectRef idx="0">
-              <a:schemeClr val="accent1"/>
-            </a:effectRef>
-            <a:fontRef idx="minor">
-              <a:schemeClr val="tx1"/>
-            </a:fontRef>
-          </p:style>
-        </p:cxnSp>
-        <p:sp>
-          <p:nvSpPr>
-            <p:cNvPr id="28" name="Freeform 27"/>
-            <p:cNvSpPr/>
-            <p:nvPr/>
-          </p:nvSpPr>
-          <p:spPr>
-            <a:xfrm>
-              <a:off x="8379" y="4142"/>
-              <a:ext cx="1432" cy="165"/>
-            </a:xfrm>
-            <a:custGeom>
-              <a:avLst/>
-              <a:gdLst>
-                <a:gd name="connisteX0" fmla="*/ 0 w 909320"/>
-                <a:gd name="connsiteY0" fmla="*/ 61747 h 105080"/>
-                <a:gd name="connisteX1" fmla="*/ 152400 w 909320"/>
-                <a:gd name="connsiteY1" fmla="*/ 14122 h 105080"/>
-                <a:gd name="connisteX2" fmla="*/ 247650 w 909320"/>
-                <a:gd name="connsiteY2" fmla="*/ 104927 h 105080"/>
-                <a:gd name="connisteX3" fmla="*/ 409575 w 909320"/>
-                <a:gd name="connsiteY3" fmla="*/ 33172 h 105080"/>
-                <a:gd name="connisteX4" fmla="*/ 519430 w 909320"/>
-                <a:gd name="connsiteY4" fmla="*/ 71272 h 105080"/>
-                <a:gd name="connisteX5" fmla="*/ 661670 w 909320"/>
-                <a:gd name="connsiteY5" fmla="*/ 152 h 105080"/>
-                <a:gd name="connisteX6" fmla="*/ 762000 w 909320"/>
-                <a:gd name="connsiteY6" fmla="*/ 90322 h 105080"/>
-                <a:gd name="connisteX7" fmla="*/ 876300 w 909320"/>
-                <a:gd name="connsiteY7" fmla="*/ 57302 h 105080"/>
-                <a:gd name="connisteX8" fmla="*/ 909320 w 909320"/>
-                <a:gd name="connsiteY8" fmla="*/ 52222 h 105080"/>
-                <a:gd name="connisteX9" fmla="*/ 1080770 w 909320"/>
-                <a:gd name="connsiteY9" fmla="*/ 76352 h 105080"/>
-              </a:gdLst>
-              <a:ahLst/>
-              <a:cxnLst>
-                <a:cxn ang="0">
-                  <a:pos x="connisteX0" y="connsiteY0"/>
-                </a:cxn>
-                <a:cxn ang="0">
-                  <a:pos x="connisteX1" y="connsiteY1"/>
-                </a:cxn>
-                <a:cxn ang="0">
-                  <a:pos x="connisteX2" y="connsiteY2"/>
-                </a:cxn>
-                <a:cxn ang="0">
-                  <a:pos x="connisteX3" y="connsiteY3"/>
-                </a:cxn>
-                <a:cxn ang="0">
-                  <a:pos x="connisteX4" y="connsiteY4"/>
-                </a:cxn>
-                <a:cxn ang="0">
-                  <a:pos x="connisteX5" y="connsiteY5"/>
-                </a:cxn>
-                <a:cxn ang="0">
-                  <a:pos x="connisteX6" y="connsiteY6"/>
-                </a:cxn>
-                <a:cxn ang="0">
-                  <a:pos x="connisteX7" y="connsiteY7"/>
-                </a:cxn>
-                <a:cxn ang="0">
-                  <a:pos x="connisteX8" y="connsiteY8"/>
-                </a:cxn>
-                <a:cxn ang="0">
-                  <a:pos x="connisteX9" y="connsiteY9"/>
-                </a:cxn>
-              </a:cxnLst>
-              <a:rect l="l" t="t" r="r" b="b"/>
-              <a:pathLst>
-                <a:path w="909320" h="105081">
-                  <a:moveTo>
-                    <a:pt x="0" y="61748"/>
-                  </a:moveTo>
-                  <a:cubicBezTo>
-                    <a:pt x="28575" y="50318"/>
-                    <a:pt x="102870" y="5233"/>
-                    <a:pt x="152400" y="14123"/>
-                  </a:cubicBezTo>
-                  <a:cubicBezTo>
-                    <a:pt x="201930" y="23013"/>
-                    <a:pt x="196215" y="101118"/>
-                    <a:pt x="247650" y="104928"/>
-                  </a:cubicBezTo>
-                  <a:cubicBezTo>
-                    <a:pt x="299085" y="108738"/>
-                    <a:pt x="354965" y="40158"/>
-                    <a:pt x="409575" y="33173"/>
-                  </a:cubicBezTo>
-                  <a:cubicBezTo>
-                    <a:pt x="464185" y="26188"/>
-                    <a:pt x="469265" y="77623"/>
-                    <a:pt x="519430" y="71273"/>
-                  </a:cubicBezTo>
-                  <a:cubicBezTo>
-                    <a:pt x="569595" y="64923"/>
-                    <a:pt x="613410" y="-3657"/>
-                    <a:pt x="661670" y="153"/>
-                  </a:cubicBezTo>
-                  <a:cubicBezTo>
-                    <a:pt x="709930" y="3963"/>
-                    <a:pt x="718820" y="78893"/>
-                    <a:pt x="762000" y="90323"/>
-                  </a:cubicBezTo>
-                  <a:cubicBezTo>
-                    <a:pt x="805180" y="101753"/>
-                    <a:pt x="847090" y="64923"/>
-                    <a:pt x="876300" y="57303"/>
-                  </a:cubicBezTo>
-                  <a:cubicBezTo>
-                    <a:pt x="905510" y="49683"/>
-                    <a:pt x="868680" y="48413"/>
-                    <a:pt x="909320" y="52223"/>
-                  </a:cubicBezTo>
-                </a:path>
-              </a:pathLst>
-            </a:custGeom>
-            <a:noFill/>
-            <a:ln>
-              <a:solidFill>
-                <a:schemeClr val="bg1">
-                  <a:lumMod val="85000"/>
-                </a:schemeClr>
-              </a:solidFill>
-            </a:ln>
-          </p:spPr>
-          <p:style>
-            <a:lnRef idx="2">
-              <a:schemeClr val="accent1">
-                <a:shade val="50000"/>
-              </a:schemeClr>
-            </a:lnRef>
-            <a:fillRef idx="1">
-              <a:schemeClr val="accent1"/>
-            </a:fillRef>
-            <a:effectRef idx="0">
-              <a:schemeClr val="accent1"/>
-            </a:effectRef>
-            <a:fontRef idx="minor">
-              <a:schemeClr val="lt1"/>
-            </a:fontRef>
-          </p:style>
-          <p:txBody>
-            <a:bodyPr rtlCol="0" anchor="ctr"/>
-            <a:p>
-              <a:pPr algn="ctr"/>
-              <a:endParaRPr lang="en-US">
+              </a:ln>
+            </p:spPr>
+            <p:style>
+              <a:lnRef idx="1">
+                <a:schemeClr val="accent1"/>
+              </a:lnRef>
+              <a:fillRef idx="0">
+                <a:schemeClr val="accent1"/>
+              </a:fillRef>
+              <a:effectRef idx="0">
+                <a:schemeClr val="accent1"/>
+              </a:effectRef>
+              <a:fontRef idx="minor">
+                <a:schemeClr val="tx1"/>
+              </a:fontRef>
+            </p:style>
+          </p:cxnSp>
+          <p:cxnSp>
+            <p:nvCxnSpPr>
+              <p:cNvPr id="6" name="Straight Connector 5"/>
+              <p:cNvCxnSpPr/>
+              <p:nvPr/>
+            </p:nvCxnSpPr>
+            <p:spPr>
+              <a:xfrm>
+                <a:off x="4167" y="2050"/>
+                <a:ext cx="0" cy="720"/>
+              </a:xfrm>
+              <a:prstGeom prst="line">
+                <a:avLst/>
+              </a:prstGeom>
+              <a:ln w="19050">
                 <a:solidFill>
                   <a:schemeClr val="bg1">
                     <a:lumMod val="85000"/>
                   </a:schemeClr>
                 </a:solidFill>
-              </a:endParaRPr>
-            </a:p>
-          </p:txBody>
-        </p:sp>
-        <p:cxnSp>
-          <p:nvCxnSpPr>
-            <p:cNvPr id="30" name="Straight Connector 29"/>
-            <p:cNvCxnSpPr>
-              <a:stCxn id="28" idx="0"/>
-            </p:cNvCxnSpPr>
-            <p:nvPr/>
-          </p:nvCxnSpPr>
-          <p:spPr>
-            <a:xfrm flipV="1">
-              <a:off x="8379" y="4224"/>
-              <a:ext cx="1433" cy="0"/>
-            </a:xfrm>
-            <a:prstGeom prst="line">
-              <a:avLst/>
-            </a:prstGeom>
-            <a:ln w="12700">
-              <a:solidFill>
-                <a:schemeClr val="bg1">
-                  <a:lumMod val="85000"/>
+              </a:ln>
+            </p:spPr>
+            <p:style>
+              <a:lnRef idx="1">
+                <a:schemeClr val="accent1"/>
+              </a:lnRef>
+              <a:fillRef idx="0">
+                <a:schemeClr val="accent1"/>
+              </a:fillRef>
+              <a:effectRef idx="0">
+                <a:schemeClr val="accent1"/>
+              </a:effectRef>
+              <a:fontRef idx="minor">
+                <a:schemeClr val="tx1"/>
+              </a:fontRef>
+            </p:style>
+          </p:cxnSp>
+          <p:sp>
+            <p:nvSpPr>
+              <p:cNvPr id="7" name="Freeform 6"/>
+              <p:cNvSpPr/>
+              <p:nvPr/>
+            </p:nvSpPr>
+            <p:spPr>
+              <a:xfrm>
+                <a:off x="2730" y="2040"/>
+                <a:ext cx="1432" cy="165"/>
+              </a:xfrm>
+              <a:custGeom>
+                <a:avLst/>
+                <a:gdLst>
+                  <a:gd name="connisteX0" fmla="*/ 0 w 909320"/>
+                  <a:gd name="connsiteY0" fmla="*/ 61747 h 105080"/>
+                  <a:gd name="connisteX1" fmla="*/ 152400 w 909320"/>
+                  <a:gd name="connsiteY1" fmla="*/ 14122 h 105080"/>
+                  <a:gd name="connisteX2" fmla="*/ 247650 w 909320"/>
+                  <a:gd name="connsiteY2" fmla="*/ 104927 h 105080"/>
+                  <a:gd name="connisteX3" fmla="*/ 409575 w 909320"/>
+                  <a:gd name="connsiteY3" fmla="*/ 33172 h 105080"/>
+                  <a:gd name="connisteX4" fmla="*/ 519430 w 909320"/>
+                  <a:gd name="connsiteY4" fmla="*/ 71272 h 105080"/>
+                  <a:gd name="connisteX5" fmla="*/ 661670 w 909320"/>
+                  <a:gd name="connsiteY5" fmla="*/ 152 h 105080"/>
+                  <a:gd name="connisteX6" fmla="*/ 762000 w 909320"/>
+                  <a:gd name="connsiteY6" fmla="*/ 90322 h 105080"/>
+                  <a:gd name="connisteX7" fmla="*/ 876300 w 909320"/>
+                  <a:gd name="connsiteY7" fmla="*/ 57302 h 105080"/>
+                  <a:gd name="connisteX8" fmla="*/ 909320 w 909320"/>
+                  <a:gd name="connsiteY8" fmla="*/ 52222 h 105080"/>
+                  <a:gd name="connisteX9" fmla="*/ 1080770 w 909320"/>
+                  <a:gd name="connsiteY9" fmla="*/ 76352 h 105080"/>
+                </a:gdLst>
+                <a:ahLst/>
+                <a:cxnLst>
+                  <a:cxn ang="0">
+                    <a:pos x="connisteX0" y="connsiteY0"/>
+                  </a:cxn>
+                  <a:cxn ang="0">
+                    <a:pos x="connisteX1" y="connsiteY1"/>
+                  </a:cxn>
+                  <a:cxn ang="0">
+                    <a:pos x="connisteX2" y="connsiteY2"/>
+                  </a:cxn>
+                  <a:cxn ang="0">
+                    <a:pos x="connisteX3" y="connsiteY3"/>
+                  </a:cxn>
+                  <a:cxn ang="0">
+                    <a:pos x="connisteX4" y="connsiteY4"/>
+                  </a:cxn>
+                  <a:cxn ang="0">
+                    <a:pos x="connisteX5" y="connsiteY5"/>
+                  </a:cxn>
+                  <a:cxn ang="0">
+                    <a:pos x="connisteX6" y="connsiteY6"/>
+                  </a:cxn>
+                  <a:cxn ang="0">
+                    <a:pos x="connisteX7" y="connsiteY7"/>
+                  </a:cxn>
+                  <a:cxn ang="0">
+                    <a:pos x="connisteX8" y="connsiteY8"/>
+                  </a:cxn>
+                  <a:cxn ang="0">
+                    <a:pos x="connisteX9" y="connsiteY9"/>
+                  </a:cxn>
+                </a:cxnLst>
+                <a:rect l="l" t="t" r="r" b="b"/>
+                <a:pathLst>
+                  <a:path w="909320" h="105081">
+                    <a:moveTo>
+                      <a:pt x="0" y="61748"/>
+                    </a:moveTo>
+                    <a:cubicBezTo>
+                      <a:pt x="28575" y="50318"/>
+                      <a:pt x="102870" y="5233"/>
+                      <a:pt x="152400" y="14123"/>
+                    </a:cubicBezTo>
+                    <a:cubicBezTo>
+                      <a:pt x="201930" y="23013"/>
+                      <a:pt x="196215" y="101118"/>
+                      <a:pt x="247650" y="104928"/>
+                    </a:cubicBezTo>
+                    <a:cubicBezTo>
+                      <a:pt x="299085" y="108738"/>
+                      <a:pt x="354965" y="40158"/>
+                      <a:pt x="409575" y="33173"/>
+                    </a:cubicBezTo>
+                    <a:cubicBezTo>
+                      <a:pt x="464185" y="26188"/>
+                      <a:pt x="469265" y="77623"/>
+                      <a:pt x="519430" y="71273"/>
+                    </a:cubicBezTo>
+                    <a:cubicBezTo>
+                      <a:pt x="569595" y="64923"/>
+                      <a:pt x="613410" y="-3657"/>
+                      <a:pt x="661670" y="153"/>
+                    </a:cubicBezTo>
+                    <a:cubicBezTo>
+                      <a:pt x="709930" y="3963"/>
+                      <a:pt x="718820" y="78893"/>
+                      <a:pt x="762000" y="90323"/>
+                    </a:cubicBezTo>
+                    <a:cubicBezTo>
+                      <a:pt x="805180" y="101753"/>
+                      <a:pt x="847090" y="64923"/>
+                      <a:pt x="876300" y="57303"/>
+                    </a:cubicBezTo>
+                    <a:cubicBezTo>
+                      <a:pt x="905510" y="49683"/>
+                      <a:pt x="868680" y="48413"/>
+                      <a:pt x="909320" y="52223"/>
+                    </a:cubicBezTo>
+                  </a:path>
+                </a:pathLst>
+              </a:custGeom>
+              <a:noFill/>
+              <a:ln>
+                <a:solidFill>
+                  <a:schemeClr val="bg1">
+                    <a:lumMod val="85000"/>
+                  </a:schemeClr>
+                </a:solidFill>
+              </a:ln>
+            </p:spPr>
+            <p:style>
+              <a:lnRef idx="2">
+                <a:schemeClr val="accent1">
+                  <a:shade val="50000"/>
                 </a:schemeClr>
-              </a:solidFill>
-              <a:prstDash val="dash"/>
-            </a:ln>
-          </p:spPr>
-          <p:style>
-            <a:lnRef idx="1">
-              <a:schemeClr val="accent1"/>
-            </a:lnRef>
-            <a:fillRef idx="0">
-              <a:schemeClr val="accent1"/>
-            </a:fillRef>
-            <a:effectRef idx="0">
-              <a:schemeClr val="accent1"/>
-            </a:effectRef>
-            <a:fontRef idx="minor">
-              <a:schemeClr val="tx1"/>
-            </a:fontRef>
-          </p:style>
-        </p:cxnSp>
-        <p:sp>
-          <p:nvSpPr>
-            <p:cNvPr id="33" name="Text Box 32"/>
-            <p:cNvSpPr txBox="1"/>
-            <p:nvPr/>
-          </p:nvSpPr>
-          <p:spPr>
-            <a:xfrm rot="1020000">
-              <a:off x="6832" y="3349"/>
-              <a:ext cx="735" cy="419"/>
-            </a:xfrm>
-            <a:prstGeom prst="rect">
-              <a:avLst/>
-            </a:prstGeom>
-            <a:noFill/>
-          </p:spPr>
-          <p:txBody>
-            <a:bodyPr wrap="square" rtlCol="0" anchor="ctr" anchorCtr="0">
-              <a:spAutoFit/>
-            </a:bodyPr>
-            <a:p>
-              <a:pPr algn="ctr"/>
-              <a:r>
-                <a:rPr lang="" altLang="en-US" sz="2800">
+              </a:lnRef>
+              <a:fillRef idx="1">
+                <a:schemeClr val="accent1"/>
+              </a:fillRef>
+              <a:effectRef idx="0">
+                <a:schemeClr val="accent1"/>
+              </a:effectRef>
+              <a:fontRef idx="minor">
+                <a:schemeClr val="lt1"/>
+              </a:fontRef>
+            </p:style>
+            <p:txBody>
+              <a:bodyPr rtlCol="0" anchor="ctr"/>
+              <a:p>
+                <a:pPr algn="ctr"/>
+                <a:endParaRPr lang="en-US">
                   <a:solidFill>
                     <a:schemeClr val="bg1">
                       <a:lumMod val="85000"/>
                     </a:schemeClr>
                   </a:solidFill>
-                </a:rPr>
-                <a:t>...</a:t>
-              </a:r>
-              <a:endParaRPr lang="" altLang="en-US" sz="2800">
+                </a:endParaRPr>
+              </a:p>
+            </p:txBody>
+          </p:sp>
+          <p:cxnSp>
+            <p:nvCxnSpPr>
+              <p:cNvPr id="8" name="Straight Arrow Connector 7"/>
+              <p:cNvCxnSpPr/>
+              <p:nvPr/>
+            </p:nvCxnSpPr>
+            <p:spPr>
+              <a:xfrm flipV="1">
+                <a:off x="3092" y="2122"/>
+                <a:ext cx="0" cy="648"/>
+              </a:xfrm>
+              <a:prstGeom prst="straightConnector1">
+                <a:avLst/>
+              </a:prstGeom>
+              <a:ln w="57150">
+                <a:solidFill>
+                  <a:srgbClr val="00B050"/>
+                </a:solidFill>
+                <a:headEnd type="none" w="med" len="med"/>
+                <a:tailEnd type="triangle" w="med" len="med"/>
+              </a:ln>
+            </p:spPr>
+            <p:style>
+              <a:lnRef idx="1">
+                <a:schemeClr val="accent1"/>
+              </a:lnRef>
+              <a:fillRef idx="0">
+                <a:schemeClr val="accent1"/>
+              </a:fillRef>
+              <a:effectRef idx="0">
+                <a:schemeClr val="accent1"/>
+              </a:effectRef>
+              <a:fontRef idx="minor">
+                <a:schemeClr val="tx1"/>
+              </a:fontRef>
+            </p:style>
+          </p:cxnSp>
+          <p:cxnSp>
+            <p:nvCxnSpPr>
+              <p:cNvPr id="9" name="Straight Connector 8"/>
+              <p:cNvCxnSpPr>
+                <a:stCxn id="7" idx="0"/>
+              </p:cNvCxnSpPr>
+              <p:nvPr/>
+            </p:nvCxnSpPr>
+            <p:spPr>
+              <a:xfrm flipV="1">
+                <a:off x="2730" y="2122"/>
+                <a:ext cx="1433" cy="0"/>
+              </a:xfrm>
+              <a:prstGeom prst="line">
+                <a:avLst/>
+              </a:prstGeom>
+              <a:ln w="12700">
                 <a:solidFill>
                   <a:schemeClr val="bg1">
                     <a:lumMod val="85000"/>
                   </a:schemeClr>
                 </a:solidFill>
-              </a:endParaRPr>
-            </a:p>
-          </p:txBody>
-        </p:sp>
-        <p:sp>
-          <p:nvSpPr>
-            <p:cNvPr id="34" name="Down Arrow 33"/>
-            <p:cNvSpPr/>
-            <p:nvPr/>
-          </p:nvSpPr>
-          <p:spPr>
-            <a:xfrm>
-              <a:off x="3338" y="1523"/>
-              <a:ext cx="218" cy="517"/>
-            </a:xfrm>
-            <a:prstGeom prst="downArrow">
-              <a:avLst/>
-            </a:prstGeom>
-            <a:solidFill>
-              <a:srgbClr val="FD0062"/>
-            </a:solidFill>
-            <a:ln>
+                <a:prstDash val="dash"/>
+              </a:ln>
+            </p:spPr>
+            <p:style>
+              <a:lnRef idx="1">
+                <a:schemeClr val="accent1"/>
+              </a:lnRef>
+              <a:fillRef idx="0">
+                <a:schemeClr val="accent1"/>
+              </a:fillRef>
+              <a:effectRef idx="0">
+                <a:schemeClr val="accent1"/>
+              </a:effectRef>
+              <a:fontRef idx="minor">
+                <a:schemeClr val="tx1"/>
+              </a:fontRef>
+            </p:style>
+          </p:cxnSp>
+          <p:cxnSp>
+            <p:nvCxnSpPr>
+              <p:cNvPr id="12" name="Straight Connector 11"/>
+              <p:cNvCxnSpPr/>
+              <p:nvPr/>
+            </p:nvCxnSpPr>
+            <p:spPr>
+              <a:xfrm>
+                <a:off x="4524" y="2595"/>
+                <a:ext cx="0" cy="720"/>
+              </a:xfrm>
+              <a:prstGeom prst="line">
+                <a:avLst/>
+              </a:prstGeom>
+              <a:ln w="19050">
+                <a:solidFill>
+                  <a:schemeClr val="bg1">
+                    <a:lumMod val="85000"/>
+                  </a:schemeClr>
+                </a:solidFill>
+              </a:ln>
+            </p:spPr>
+            <p:style>
+              <a:lnRef idx="1">
+                <a:schemeClr val="accent1"/>
+              </a:lnRef>
+              <a:fillRef idx="0">
+                <a:schemeClr val="accent1"/>
+              </a:fillRef>
+              <a:effectRef idx="0">
+                <a:schemeClr val="accent1"/>
+              </a:effectRef>
+              <a:fontRef idx="minor">
+                <a:schemeClr val="tx1"/>
+              </a:fontRef>
+            </p:style>
+          </p:cxnSp>
+          <p:cxnSp>
+            <p:nvCxnSpPr>
+              <p:cNvPr id="13" name="Straight Connector 12"/>
+              <p:cNvCxnSpPr/>
+              <p:nvPr/>
+            </p:nvCxnSpPr>
+            <p:spPr>
+              <a:xfrm>
+                <a:off x="4524" y="3315"/>
+                <a:ext cx="1440" cy="0"/>
+              </a:xfrm>
+              <a:prstGeom prst="line">
+                <a:avLst/>
+              </a:prstGeom>
+              <a:ln w="19050">
+                <a:solidFill>
+                  <a:schemeClr val="bg1">
+                    <a:lumMod val="85000"/>
+                  </a:schemeClr>
+                </a:solidFill>
+              </a:ln>
+            </p:spPr>
+            <p:style>
+              <a:lnRef idx="1">
+                <a:schemeClr val="accent1"/>
+              </a:lnRef>
+              <a:fillRef idx="0">
+                <a:schemeClr val="accent1"/>
+              </a:fillRef>
+              <a:effectRef idx="0">
+                <a:schemeClr val="accent1"/>
+              </a:effectRef>
+              <a:fontRef idx="minor">
+                <a:schemeClr val="tx1"/>
+              </a:fontRef>
+            </p:style>
+          </p:cxnSp>
+          <p:cxnSp>
+            <p:nvCxnSpPr>
+              <p:cNvPr id="14" name="Straight Connector 13"/>
+              <p:cNvCxnSpPr/>
+              <p:nvPr/>
+            </p:nvCxnSpPr>
+            <p:spPr>
+              <a:xfrm>
+                <a:off x="5964" y="2595"/>
+                <a:ext cx="0" cy="720"/>
+              </a:xfrm>
+              <a:prstGeom prst="line">
+                <a:avLst/>
+              </a:prstGeom>
+              <a:ln w="19050">
+                <a:solidFill>
+                  <a:schemeClr val="bg1">
+                    <a:lumMod val="85000"/>
+                  </a:schemeClr>
+                </a:solidFill>
+              </a:ln>
+            </p:spPr>
+            <p:style>
+              <a:lnRef idx="1">
+                <a:schemeClr val="accent1"/>
+              </a:lnRef>
+              <a:fillRef idx="0">
+                <a:schemeClr val="accent1"/>
+              </a:fillRef>
+              <a:effectRef idx="0">
+                <a:schemeClr val="accent1"/>
+              </a:effectRef>
+              <a:fontRef idx="minor">
+                <a:schemeClr val="tx1"/>
+              </a:fontRef>
+            </p:style>
+          </p:cxnSp>
+          <p:sp>
+            <p:nvSpPr>
+              <p:cNvPr id="15" name="Freeform 14"/>
+              <p:cNvSpPr/>
+              <p:nvPr/>
+            </p:nvSpPr>
+            <p:spPr>
+              <a:xfrm>
+                <a:off x="4527" y="2585"/>
+                <a:ext cx="1432" cy="165"/>
+              </a:xfrm>
+              <a:custGeom>
+                <a:avLst/>
+                <a:gdLst>
+                  <a:gd name="connisteX0" fmla="*/ 0 w 909320"/>
+                  <a:gd name="connsiteY0" fmla="*/ 61747 h 105080"/>
+                  <a:gd name="connisteX1" fmla="*/ 152400 w 909320"/>
+                  <a:gd name="connsiteY1" fmla="*/ 14122 h 105080"/>
+                  <a:gd name="connisteX2" fmla="*/ 247650 w 909320"/>
+                  <a:gd name="connsiteY2" fmla="*/ 104927 h 105080"/>
+                  <a:gd name="connisteX3" fmla="*/ 409575 w 909320"/>
+                  <a:gd name="connsiteY3" fmla="*/ 33172 h 105080"/>
+                  <a:gd name="connisteX4" fmla="*/ 519430 w 909320"/>
+                  <a:gd name="connsiteY4" fmla="*/ 71272 h 105080"/>
+                  <a:gd name="connisteX5" fmla="*/ 661670 w 909320"/>
+                  <a:gd name="connsiteY5" fmla="*/ 152 h 105080"/>
+                  <a:gd name="connisteX6" fmla="*/ 762000 w 909320"/>
+                  <a:gd name="connsiteY6" fmla="*/ 90322 h 105080"/>
+                  <a:gd name="connisteX7" fmla="*/ 876300 w 909320"/>
+                  <a:gd name="connsiteY7" fmla="*/ 57302 h 105080"/>
+                  <a:gd name="connisteX8" fmla="*/ 909320 w 909320"/>
+                  <a:gd name="connsiteY8" fmla="*/ 52222 h 105080"/>
+                  <a:gd name="connisteX9" fmla="*/ 1080770 w 909320"/>
+                  <a:gd name="connsiteY9" fmla="*/ 76352 h 105080"/>
+                </a:gdLst>
+                <a:ahLst/>
+                <a:cxnLst>
+                  <a:cxn ang="0">
+                    <a:pos x="connisteX0" y="connsiteY0"/>
+                  </a:cxn>
+                  <a:cxn ang="0">
+                    <a:pos x="connisteX1" y="connsiteY1"/>
+                  </a:cxn>
+                  <a:cxn ang="0">
+                    <a:pos x="connisteX2" y="connsiteY2"/>
+                  </a:cxn>
+                  <a:cxn ang="0">
+                    <a:pos x="connisteX3" y="connsiteY3"/>
+                  </a:cxn>
+                  <a:cxn ang="0">
+                    <a:pos x="connisteX4" y="connsiteY4"/>
+                  </a:cxn>
+                  <a:cxn ang="0">
+                    <a:pos x="connisteX5" y="connsiteY5"/>
+                  </a:cxn>
+                  <a:cxn ang="0">
+                    <a:pos x="connisteX6" y="connsiteY6"/>
+                  </a:cxn>
+                  <a:cxn ang="0">
+                    <a:pos x="connisteX7" y="connsiteY7"/>
+                  </a:cxn>
+                  <a:cxn ang="0">
+                    <a:pos x="connisteX8" y="connsiteY8"/>
+                  </a:cxn>
+                  <a:cxn ang="0">
+                    <a:pos x="connisteX9" y="connsiteY9"/>
+                  </a:cxn>
+                </a:cxnLst>
+                <a:rect l="l" t="t" r="r" b="b"/>
+                <a:pathLst>
+                  <a:path w="909320" h="105081">
+                    <a:moveTo>
+                      <a:pt x="0" y="61748"/>
+                    </a:moveTo>
+                    <a:cubicBezTo>
+                      <a:pt x="28575" y="50318"/>
+                      <a:pt x="102870" y="5233"/>
+                      <a:pt x="152400" y="14123"/>
+                    </a:cubicBezTo>
+                    <a:cubicBezTo>
+                      <a:pt x="201930" y="23013"/>
+                      <a:pt x="196215" y="101118"/>
+                      <a:pt x="247650" y="104928"/>
+                    </a:cubicBezTo>
+                    <a:cubicBezTo>
+                      <a:pt x="299085" y="108738"/>
+                      <a:pt x="354965" y="40158"/>
+                      <a:pt x="409575" y="33173"/>
+                    </a:cubicBezTo>
+                    <a:cubicBezTo>
+                      <a:pt x="464185" y="26188"/>
+                      <a:pt x="469265" y="77623"/>
+                      <a:pt x="519430" y="71273"/>
+                    </a:cubicBezTo>
+                    <a:cubicBezTo>
+                      <a:pt x="569595" y="64923"/>
+                      <a:pt x="613410" y="-3657"/>
+                      <a:pt x="661670" y="153"/>
+                    </a:cubicBezTo>
+                    <a:cubicBezTo>
+                      <a:pt x="709930" y="3963"/>
+                      <a:pt x="718820" y="78893"/>
+                      <a:pt x="762000" y="90323"/>
+                    </a:cubicBezTo>
+                    <a:cubicBezTo>
+                      <a:pt x="805180" y="101753"/>
+                      <a:pt x="847090" y="64923"/>
+                      <a:pt x="876300" y="57303"/>
+                    </a:cubicBezTo>
+                    <a:cubicBezTo>
+                      <a:pt x="905510" y="49683"/>
+                      <a:pt x="868680" y="48413"/>
+                      <a:pt x="909320" y="52223"/>
+                    </a:cubicBezTo>
+                  </a:path>
+                </a:pathLst>
+              </a:custGeom>
               <a:noFill/>
-            </a:ln>
-          </p:spPr>
-          <p:style>
-            <a:lnRef idx="2">
-              <a:schemeClr val="accent1">
-                <a:shade val="50000"/>
-              </a:schemeClr>
-            </a:lnRef>
-            <a:fillRef idx="1">
-              <a:schemeClr val="accent1"/>
-            </a:fillRef>
-            <a:effectRef idx="0">
-              <a:schemeClr val="accent1"/>
-            </a:effectRef>
-            <a:fontRef idx="minor">
-              <a:schemeClr val="lt1"/>
-            </a:fontRef>
-          </p:style>
-          <p:txBody>
-            <a:bodyPr rtlCol="0" anchor="ctr"/>
-            <a:p>
-              <a:pPr algn="ctr"/>
-              <a:endParaRPr lang="en-US"/>
-            </a:p>
-          </p:txBody>
-        </p:sp>
-        <p:sp>
-          <p:nvSpPr>
-            <p:cNvPr id="35" name="Down Arrow 34"/>
-            <p:cNvSpPr/>
-            <p:nvPr/>
-          </p:nvSpPr>
-          <p:spPr>
-            <a:xfrm>
-              <a:off x="5134" y="2068"/>
-              <a:ext cx="218" cy="517"/>
-            </a:xfrm>
-            <a:prstGeom prst="downArrow">
-              <a:avLst/>
-            </a:prstGeom>
-            <a:solidFill>
-              <a:srgbClr val="FD0062"/>
-            </a:solidFill>
-            <a:ln>
+              <a:ln>
+                <a:solidFill>
+                  <a:schemeClr val="bg1">
+                    <a:lumMod val="85000"/>
+                  </a:schemeClr>
+                </a:solidFill>
+              </a:ln>
+            </p:spPr>
+            <p:style>
+              <a:lnRef idx="2">
+                <a:schemeClr val="accent1">
+                  <a:shade val="50000"/>
+                </a:schemeClr>
+              </a:lnRef>
+              <a:fillRef idx="1">
+                <a:schemeClr val="accent1"/>
+              </a:fillRef>
+              <a:effectRef idx="0">
+                <a:schemeClr val="accent1"/>
+              </a:effectRef>
+              <a:fontRef idx="minor">
+                <a:schemeClr val="lt1"/>
+              </a:fontRef>
+            </p:style>
+            <p:txBody>
+              <a:bodyPr rtlCol="0" anchor="ctr"/>
+              <a:p>
+                <a:pPr algn="ctr"/>
+                <a:endParaRPr lang="en-US">
+                  <a:solidFill>
+                    <a:schemeClr val="bg1">
+                      <a:lumMod val="85000"/>
+                    </a:schemeClr>
+                  </a:solidFill>
+                </a:endParaRPr>
+              </a:p>
+            </p:txBody>
+          </p:sp>
+          <p:cxnSp>
+            <p:nvCxnSpPr>
+              <p:cNvPr id="17" name="Straight Connector 16"/>
+              <p:cNvCxnSpPr>
+                <a:stCxn id="15" idx="0"/>
+              </p:cNvCxnSpPr>
+              <p:nvPr/>
+            </p:nvCxnSpPr>
+            <p:spPr>
+              <a:xfrm flipV="1">
+                <a:off x="4527" y="2667"/>
+                <a:ext cx="1433" cy="0"/>
+              </a:xfrm>
+              <a:prstGeom prst="line">
+                <a:avLst/>
+              </a:prstGeom>
+              <a:ln w="12700">
+                <a:solidFill>
+                  <a:schemeClr val="bg1">
+                    <a:lumMod val="85000"/>
+                  </a:schemeClr>
+                </a:solidFill>
+                <a:prstDash val="dash"/>
+              </a:ln>
+            </p:spPr>
+            <p:style>
+              <a:lnRef idx="1">
+                <a:schemeClr val="accent1"/>
+              </a:lnRef>
+              <a:fillRef idx="0">
+                <a:schemeClr val="accent1"/>
+              </a:fillRef>
+              <a:effectRef idx="0">
+                <a:schemeClr val="accent1"/>
+              </a:effectRef>
+              <a:fontRef idx="minor">
+                <a:schemeClr val="tx1"/>
+              </a:fontRef>
+            </p:style>
+          </p:cxnSp>
+          <p:cxnSp>
+            <p:nvCxnSpPr>
+              <p:cNvPr id="25" name="Straight Connector 24"/>
+              <p:cNvCxnSpPr/>
+              <p:nvPr/>
+            </p:nvCxnSpPr>
+            <p:spPr>
+              <a:xfrm>
+                <a:off x="8376" y="4152"/>
+                <a:ext cx="0" cy="720"/>
+              </a:xfrm>
+              <a:prstGeom prst="line">
+                <a:avLst/>
+              </a:prstGeom>
+              <a:ln w="19050">
+                <a:solidFill>
+                  <a:schemeClr val="bg1">
+                    <a:lumMod val="85000"/>
+                  </a:schemeClr>
+                </a:solidFill>
+              </a:ln>
+            </p:spPr>
+            <p:style>
+              <a:lnRef idx="1">
+                <a:schemeClr val="accent1"/>
+              </a:lnRef>
+              <a:fillRef idx="0">
+                <a:schemeClr val="accent1"/>
+              </a:fillRef>
+              <a:effectRef idx="0">
+                <a:schemeClr val="accent1"/>
+              </a:effectRef>
+              <a:fontRef idx="minor">
+                <a:schemeClr val="tx1"/>
+              </a:fontRef>
+            </p:style>
+          </p:cxnSp>
+          <p:cxnSp>
+            <p:nvCxnSpPr>
+              <p:cNvPr id="26" name="Straight Connector 25"/>
+              <p:cNvCxnSpPr/>
+              <p:nvPr/>
+            </p:nvCxnSpPr>
+            <p:spPr>
+              <a:xfrm>
+                <a:off x="8376" y="4872"/>
+                <a:ext cx="1440" cy="0"/>
+              </a:xfrm>
+              <a:prstGeom prst="line">
+                <a:avLst/>
+              </a:prstGeom>
+              <a:ln w="19050">
+                <a:solidFill>
+                  <a:schemeClr val="bg1">
+                    <a:lumMod val="85000"/>
+                  </a:schemeClr>
+                </a:solidFill>
+              </a:ln>
+            </p:spPr>
+            <p:style>
+              <a:lnRef idx="1">
+                <a:schemeClr val="accent1"/>
+              </a:lnRef>
+              <a:fillRef idx="0">
+                <a:schemeClr val="accent1"/>
+              </a:fillRef>
+              <a:effectRef idx="0">
+                <a:schemeClr val="accent1"/>
+              </a:effectRef>
+              <a:fontRef idx="minor">
+                <a:schemeClr val="tx1"/>
+              </a:fontRef>
+            </p:style>
+          </p:cxnSp>
+          <p:cxnSp>
+            <p:nvCxnSpPr>
+              <p:cNvPr id="27" name="Straight Connector 26"/>
+              <p:cNvCxnSpPr/>
+              <p:nvPr/>
+            </p:nvCxnSpPr>
+            <p:spPr>
+              <a:xfrm>
+                <a:off x="9816" y="4152"/>
+                <a:ext cx="0" cy="720"/>
+              </a:xfrm>
+              <a:prstGeom prst="line">
+                <a:avLst/>
+              </a:prstGeom>
+              <a:ln w="19050">
+                <a:solidFill>
+                  <a:schemeClr val="bg1">
+                    <a:lumMod val="85000"/>
+                  </a:schemeClr>
+                </a:solidFill>
+              </a:ln>
+            </p:spPr>
+            <p:style>
+              <a:lnRef idx="1">
+                <a:schemeClr val="accent1"/>
+              </a:lnRef>
+              <a:fillRef idx="0">
+                <a:schemeClr val="accent1"/>
+              </a:fillRef>
+              <a:effectRef idx="0">
+                <a:schemeClr val="accent1"/>
+              </a:effectRef>
+              <a:fontRef idx="minor">
+                <a:schemeClr val="tx1"/>
+              </a:fontRef>
+            </p:style>
+          </p:cxnSp>
+          <p:sp>
+            <p:nvSpPr>
+              <p:cNvPr id="28" name="Freeform 27"/>
+              <p:cNvSpPr/>
+              <p:nvPr/>
+            </p:nvSpPr>
+            <p:spPr>
+              <a:xfrm>
+                <a:off x="8379" y="4142"/>
+                <a:ext cx="1432" cy="165"/>
+              </a:xfrm>
+              <a:custGeom>
+                <a:avLst/>
+                <a:gdLst>
+                  <a:gd name="connisteX0" fmla="*/ 0 w 909320"/>
+                  <a:gd name="connsiteY0" fmla="*/ 61747 h 105080"/>
+                  <a:gd name="connisteX1" fmla="*/ 152400 w 909320"/>
+                  <a:gd name="connsiteY1" fmla="*/ 14122 h 105080"/>
+                  <a:gd name="connisteX2" fmla="*/ 247650 w 909320"/>
+                  <a:gd name="connsiteY2" fmla="*/ 104927 h 105080"/>
+                  <a:gd name="connisteX3" fmla="*/ 409575 w 909320"/>
+                  <a:gd name="connsiteY3" fmla="*/ 33172 h 105080"/>
+                  <a:gd name="connisteX4" fmla="*/ 519430 w 909320"/>
+                  <a:gd name="connsiteY4" fmla="*/ 71272 h 105080"/>
+                  <a:gd name="connisteX5" fmla="*/ 661670 w 909320"/>
+                  <a:gd name="connsiteY5" fmla="*/ 152 h 105080"/>
+                  <a:gd name="connisteX6" fmla="*/ 762000 w 909320"/>
+                  <a:gd name="connsiteY6" fmla="*/ 90322 h 105080"/>
+                  <a:gd name="connisteX7" fmla="*/ 876300 w 909320"/>
+                  <a:gd name="connsiteY7" fmla="*/ 57302 h 105080"/>
+                  <a:gd name="connisteX8" fmla="*/ 909320 w 909320"/>
+                  <a:gd name="connsiteY8" fmla="*/ 52222 h 105080"/>
+                  <a:gd name="connisteX9" fmla="*/ 1080770 w 909320"/>
+                  <a:gd name="connsiteY9" fmla="*/ 76352 h 105080"/>
+                </a:gdLst>
+                <a:ahLst/>
+                <a:cxnLst>
+                  <a:cxn ang="0">
+                    <a:pos x="connisteX0" y="connsiteY0"/>
+                  </a:cxn>
+                  <a:cxn ang="0">
+                    <a:pos x="connisteX1" y="connsiteY1"/>
+                  </a:cxn>
+                  <a:cxn ang="0">
+                    <a:pos x="connisteX2" y="connsiteY2"/>
+                  </a:cxn>
+                  <a:cxn ang="0">
+                    <a:pos x="connisteX3" y="connsiteY3"/>
+                  </a:cxn>
+                  <a:cxn ang="0">
+                    <a:pos x="connisteX4" y="connsiteY4"/>
+                  </a:cxn>
+                  <a:cxn ang="0">
+                    <a:pos x="connisteX5" y="connsiteY5"/>
+                  </a:cxn>
+                  <a:cxn ang="0">
+                    <a:pos x="connisteX6" y="connsiteY6"/>
+                  </a:cxn>
+                  <a:cxn ang="0">
+                    <a:pos x="connisteX7" y="connsiteY7"/>
+                  </a:cxn>
+                  <a:cxn ang="0">
+                    <a:pos x="connisteX8" y="connsiteY8"/>
+                  </a:cxn>
+                  <a:cxn ang="0">
+                    <a:pos x="connisteX9" y="connsiteY9"/>
+                  </a:cxn>
+                </a:cxnLst>
+                <a:rect l="l" t="t" r="r" b="b"/>
+                <a:pathLst>
+                  <a:path w="909320" h="105081">
+                    <a:moveTo>
+                      <a:pt x="0" y="61748"/>
+                    </a:moveTo>
+                    <a:cubicBezTo>
+                      <a:pt x="28575" y="50318"/>
+                      <a:pt x="102870" y="5233"/>
+                      <a:pt x="152400" y="14123"/>
+                    </a:cubicBezTo>
+                    <a:cubicBezTo>
+                      <a:pt x="201930" y="23013"/>
+                      <a:pt x="196215" y="101118"/>
+                      <a:pt x="247650" y="104928"/>
+                    </a:cubicBezTo>
+                    <a:cubicBezTo>
+                      <a:pt x="299085" y="108738"/>
+                      <a:pt x="354965" y="40158"/>
+                      <a:pt x="409575" y="33173"/>
+                    </a:cubicBezTo>
+                    <a:cubicBezTo>
+                      <a:pt x="464185" y="26188"/>
+                      <a:pt x="469265" y="77623"/>
+                      <a:pt x="519430" y="71273"/>
+                    </a:cubicBezTo>
+                    <a:cubicBezTo>
+                      <a:pt x="569595" y="64923"/>
+                      <a:pt x="613410" y="-3657"/>
+                      <a:pt x="661670" y="153"/>
+                    </a:cubicBezTo>
+                    <a:cubicBezTo>
+                      <a:pt x="709930" y="3963"/>
+                      <a:pt x="718820" y="78893"/>
+                      <a:pt x="762000" y="90323"/>
+                    </a:cubicBezTo>
+                    <a:cubicBezTo>
+                      <a:pt x="805180" y="101753"/>
+                      <a:pt x="847090" y="64923"/>
+                      <a:pt x="876300" y="57303"/>
+                    </a:cubicBezTo>
+                    <a:cubicBezTo>
+                      <a:pt x="905510" y="49683"/>
+                      <a:pt x="868680" y="48413"/>
+                      <a:pt x="909320" y="52223"/>
+                    </a:cubicBezTo>
+                  </a:path>
+                </a:pathLst>
+              </a:custGeom>
               <a:noFill/>
-            </a:ln>
-          </p:spPr>
-          <p:style>
-            <a:lnRef idx="2">
-              <a:schemeClr val="accent1">
-                <a:shade val="50000"/>
-              </a:schemeClr>
-            </a:lnRef>
-            <a:fillRef idx="1">
-              <a:schemeClr val="accent1"/>
-            </a:fillRef>
-            <a:effectRef idx="0">
-              <a:schemeClr val="accent1"/>
-            </a:effectRef>
-            <a:fontRef idx="minor">
-              <a:schemeClr val="lt1"/>
-            </a:fontRef>
-          </p:style>
-          <p:txBody>
-            <a:bodyPr rtlCol="0" anchor="ctr"/>
-            <a:p>
-              <a:pPr algn="ctr"/>
-              <a:endParaRPr lang="en-US"/>
-            </a:p>
-          </p:txBody>
-        </p:sp>
-        <p:sp>
-          <p:nvSpPr>
-            <p:cNvPr id="36" name="Down Arrow 35"/>
-            <p:cNvSpPr/>
-            <p:nvPr/>
-          </p:nvSpPr>
-          <p:spPr>
-            <a:xfrm>
-              <a:off x="8987" y="3625"/>
-              <a:ext cx="218" cy="517"/>
-            </a:xfrm>
-            <a:prstGeom prst="downArrow">
-              <a:avLst/>
-            </a:prstGeom>
-            <a:solidFill>
-              <a:srgbClr val="FD0062"/>
-            </a:solidFill>
-            <a:ln>
+              <a:ln>
+                <a:solidFill>
+                  <a:schemeClr val="bg1">
+                    <a:lumMod val="85000"/>
+                  </a:schemeClr>
+                </a:solidFill>
+              </a:ln>
+            </p:spPr>
+            <p:style>
+              <a:lnRef idx="2">
+                <a:schemeClr val="accent1">
+                  <a:shade val="50000"/>
+                </a:schemeClr>
+              </a:lnRef>
+              <a:fillRef idx="1">
+                <a:schemeClr val="accent1"/>
+              </a:fillRef>
+              <a:effectRef idx="0">
+                <a:schemeClr val="accent1"/>
+              </a:effectRef>
+              <a:fontRef idx="minor">
+                <a:schemeClr val="lt1"/>
+              </a:fontRef>
+            </p:style>
+            <p:txBody>
+              <a:bodyPr rtlCol="0" anchor="ctr"/>
+              <a:p>
+                <a:pPr algn="ctr"/>
+                <a:endParaRPr lang="en-US">
+                  <a:solidFill>
+                    <a:schemeClr val="bg1">
+                      <a:lumMod val="85000"/>
+                    </a:schemeClr>
+                  </a:solidFill>
+                </a:endParaRPr>
+              </a:p>
+            </p:txBody>
+          </p:sp>
+          <p:cxnSp>
+            <p:nvCxnSpPr>
+              <p:cNvPr id="30" name="Straight Connector 29"/>
+              <p:cNvCxnSpPr>
+                <a:stCxn id="28" idx="0"/>
+              </p:cNvCxnSpPr>
+              <p:nvPr/>
+            </p:nvCxnSpPr>
+            <p:spPr>
+              <a:xfrm flipV="1">
+                <a:off x="8379" y="4224"/>
+                <a:ext cx="1433" cy="0"/>
+              </a:xfrm>
+              <a:prstGeom prst="line">
+                <a:avLst/>
+              </a:prstGeom>
+              <a:ln w="12700">
+                <a:solidFill>
+                  <a:schemeClr val="bg1">
+                    <a:lumMod val="85000"/>
+                  </a:schemeClr>
+                </a:solidFill>
+                <a:prstDash val="dash"/>
+              </a:ln>
+            </p:spPr>
+            <p:style>
+              <a:lnRef idx="1">
+                <a:schemeClr val="accent1"/>
+              </a:lnRef>
+              <a:fillRef idx="0">
+                <a:schemeClr val="accent1"/>
+              </a:fillRef>
+              <a:effectRef idx="0">
+                <a:schemeClr val="accent1"/>
+              </a:effectRef>
+              <a:fontRef idx="minor">
+                <a:schemeClr val="tx1"/>
+              </a:fontRef>
+            </p:style>
+          </p:cxnSp>
+          <p:sp>
+            <p:nvSpPr>
+              <p:cNvPr id="33" name="Text Box 32"/>
+              <p:cNvSpPr txBox="1"/>
+              <p:nvPr/>
+            </p:nvSpPr>
+            <p:spPr>
+              <a:xfrm rot="1020000">
+                <a:off x="6832" y="3349"/>
+                <a:ext cx="735" cy="419"/>
+              </a:xfrm>
+              <a:prstGeom prst="rect">
+                <a:avLst/>
+              </a:prstGeom>
               <a:noFill/>
-            </a:ln>
-          </p:spPr>
-          <p:style>
-            <a:lnRef idx="2">
-              <a:schemeClr val="accent1">
-                <a:shade val="50000"/>
-              </a:schemeClr>
-            </a:lnRef>
-            <a:fillRef idx="1">
-              <a:schemeClr val="accent1"/>
-            </a:fillRef>
-            <a:effectRef idx="0">
-              <a:schemeClr val="accent1"/>
-            </a:effectRef>
-            <a:fontRef idx="minor">
-              <a:schemeClr val="lt1"/>
-            </a:fontRef>
-          </p:style>
-          <p:txBody>
-            <a:bodyPr rtlCol="0" anchor="ctr"/>
-            <a:p>
-              <a:pPr algn="ctr"/>
-              <a:endParaRPr lang="en-US"/>
-            </a:p>
-          </p:txBody>
-        </p:sp>
-        <p:sp>
-          <p:nvSpPr>
-            <p:cNvPr id="37" name="Left Arrow 36"/>
-            <p:cNvSpPr/>
-            <p:nvPr/>
-          </p:nvSpPr>
-          <p:spPr>
-            <a:xfrm rot="2700000">
-              <a:off x="3600" y="2735"/>
-              <a:ext cx="1296" cy="144"/>
-            </a:xfrm>
-            <a:prstGeom prst="leftArrow">
-              <a:avLst/>
-            </a:prstGeom>
-            <a:solidFill>
-              <a:srgbClr val="7CE0D1"/>
-            </a:solidFill>
-            <a:ln>
+            </p:spPr>
+            <p:txBody>
+              <a:bodyPr wrap="square" rtlCol="0" anchor="ctr" anchorCtr="0">
+                <a:spAutoFit/>
+              </a:bodyPr>
+              <a:p>
+                <a:pPr algn="ctr"/>
+                <a:r>
+                  <a:rPr lang="en-US" altLang="en-US" sz="2800">
+                    <a:solidFill>
+                      <a:schemeClr val="bg1">
+                        <a:lumMod val="85000"/>
+                      </a:schemeClr>
+                    </a:solidFill>
+                  </a:rPr>
+                  <a:t>...</a:t>
+                </a:r>
+                <a:endParaRPr lang="en-US" altLang="en-US" sz="2800">
+                  <a:solidFill>
+                    <a:schemeClr val="bg1">
+                      <a:lumMod val="85000"/>
+                    </a:schemeClr>
+                  </a:solidFill>
+                </a:endParaRPr>
+              </a:p>
+            </p:txBody>
+          </p:sp>
+          <p:sp>
+            <p:nvSpPr>
+              <p:cNvPr id="34" name="Down Arrow 33"/>
+              <p:cNvSpPr/>
+              <p:nvPr/>
+            </p:nvSpPr>
+            <p:spPr>
+              <a:xfrm>
+                <a:off x="3338" y="1523"/>
+                <a:ext cx="218" cy="517"/>
+              </a:xfrm>
+              <a:prstGeom prst="downArrow">
+                <a:avLst/>
+              </a:prstGeom>
+              <a:solidFill>
+                <a:srgbClr val="FD0062"/>
+              </a:solidFill>
+              <a:ln>
+                <a:noFill/>
+              </a:ln>
+            </p:spPr>
+            <p:style>
+              <a:lnRef idx="2">
+                <a:schemeClr val="accent1">
+                  <a:shade val="50000"/>
+                </a:schemeClr>
+              </a:lnRef>
+              <a:fillRef idx="1">
+                <a:schemeClr val="accent1"/>
+              </a:fillRef>
+              <a:effectRef idx="0">
+                <a:schemeClr val="accent1"/>
+              </a:effectRef>
+              <a:fontRef idx="minor">
+                <a:schemeClr val="lt1"/>
+              </a:fontRef>
+            </p:style>
+            <p:txBody>
+              <a:bodyPr rtlCol="0" anchor="ctr"/>
+              <a:p>
+                <a:pPr algn="ctr"/>
+                <a:endParaRPr lang="en-US"/>
+              </a:p>
+            </p:txBody>
+          </p:sp>
+          <p:sp>
+            <p:nvSpPr>
+              <p:cNvPr id="35" name="Down Arrow 34"/>
+              <p:cNvSpPr/>
+              <p:nvPr/>
+            </p:nvSpPr>
+            <p:spPr>
+              <a:xfrm>
+                <a:off x="5134" y="2068"/>
+                <a:ext cx="218" cy="517"/>
+              </a:xfrm>
+              <a:prstGeom prst="downArrow">
+                <a:avLst/>
+              </a:prstGeom>
+              <a:solidFill>
+                <a:srgbClr val="FD0062"/>
+              </a:solidFill>
+              <a:ln>
+                <a:noFill/>
+              </a:ln>
+            </p:spPr>
+            <p:style>
+              <a:lnRef idx="2">
+                <a:schemeClr val="accent1">
+                  <a:shade val="50000"/>
+                </a:schemeClr>
+              </a:lnRef>
+              <a:fillRef idx="1">
+                <a:schemeClr val="accent1"/>
+              </a:fillRef>
+              <a:effectRef idx="0">
+                <a:schemeClr val="accent1"/>
+              </a:effectRef>
+              <a:fontRef idx="minor">
+                <a:schemeClr val="lt1"/>
+              </a:fontRef>
+            </p:style>
+            <p:txBody>
+              <a:bodyPr rtlCol="0" anchor="ctr"/>
+              <a:p>
+                <a:pPr algn="ctr"/>
+                <a:endParaRPr lang="en-US"/>
+              </a:p>
+            </p:txBody>
+          </p:sp>
+          <p:sp>
+            <p:nvSpPr>
+              <p:cNvPr id="36" name="Down Arrow 35"/>
+              <p:cNvSpPr/>
+              <p:nvPr/>
+            </p:nvSpPr>
+            <p:spPr>
+              <a:xfrm>
+                <a:off x="8987" y="3625"/>
+                <a:ext cx="218" cy="517"/>
+              </a:xfrm>
+              <a:prstGeom prst="downArrow">
+                <a:avLst/>
+              </a:prstGeom>
+              <a:solidFill>
+                <a:srgbClr val="FD0062"/>
+              </a:solidFill>
+              <a:ln>
+                <a:noFill/>
+              </a:ln>
+            </p:spPr>
+            <p:style>
+              <a:lnRef idx="2">
+                <a:schemeClr val="accent1">
+                  <a:shade val="50000"/>
+                </a:schemeClr>
+              </a:lnRef>
+              <a:fillRef idx="1">
+                <a:schemeClr val="accent1"/>
+              </a:fillRef>
+              <a:effectRef idx="0">
+                <a:schemeClr val="accent1"/>
+              </a:effectRef>
+              <a:fontRef idx="minor">
+                <a:schemeClr val="lt1"/>
+              </a:fontRef>
+            </p:style>
+            <p:txBody>
+              <a:bodyPr rtlCol="0" anchor="ctr"/>
+              <a:p>
+                <a:pPr algn="ctr"/>
+                <a:endParaRPr lang="en-US"/>
+              </a:p>
+            </p:txBody>
+          </p:sp>
+          <p:sp>
+            <p:nvSpPr>
+              <p:cNvPr id="37" name="Left Arrow 36"/>
+              <p:cNvSpPr/>
+              <p:nvPr/>
+            </p:nvSpPr>
+            <p:spPr>
+              <a:xfrm rot="2700000">
+                <a:off x="3600" y="2735"/>
+                <a:ext cx="1296" cy="144"/>
+              </a:xfrm>
+              <a:prstGeom prst="leftArrow">
+                <a:avLst/>
+              </a:prstGeom>
+              <a:solidFill>
+                <a:srgbClr val="7CE0D1"/>
+              </a:solidFill>
+              <a:ln>
+                <a:noFill/>
+              </a:ln>
+            </p:spPr>
+            <p:style>
+              <a:lnRef idx="2">
+                <a:schemeClr val="accent1">
+                  <a:shade val="50000"/>
+                </a:schemeClr>
+              </a:lnRef>
+              <a:fillRef idx="1">
+                <a:schemeClr val="accent1"/>
+              </a:fillRef>
+              <a:effectRef idx="0">
+                <a:schemeClr val="accent1"/>
+              </a:effectRef>
+              <a:fontRef idx="minor">
+                <a:schemeClr val="lt1"/>
+              </a:fontRef>
+            </p:style>
+            <p:txBody>
+              <a:bodyPr rtlCol="0" anchor="ctr"/>
+              <a:p>
+                <a:pPr algn="ctr"/>
+                <a:endParaRPr lang="en-US"/>
+              </a:p>
+            </p:txBody>
+          </p:sp>
+          <p:sp>
+            <p:nvSpPr>
+              <p:cNvPr id="38" name="Left Arrow 37"/>
+              <p:cNvSpPr/>
+              <p:nvPr/>
+            </p:nvSpPr>
+            <p:spPr>
+              <a:xfrm rot="2700000">
+                <a:off x="5421" y="3280"/>
+                <a:ext cx="1296" cy="144"/>
+              </a:xfrm>
+              <a:prstGeom prst="leftArrow">
+                <a:avLst/>
+              </a:prstGeom>
+              <a:solidFill>
+                <a:srgbClr val="7CE0D1"/>
+              </a:solidFill>
+              <a:ln>
+                <a:noFill/>
+              </a:ln>
+            </p:spPr>
+            <p:style>
+              <a:lnRef idx="2">
+                <a:schemeClr val="accent1">
+                  <a:shade val="50000"/>
+                </a:schemeClr>
+              </a:lnRef>
+              <a:fillRef idx="1">
+                <a:schemeClr val="accent1"/>
+              </a:fillRef>
+              <a:effectRef idx="0">
+                <a:schemeClr val="accent1"/>
+              </a:effectRef>
+              <a:fontRef idx="minor">
+                <a:schemeClr val="lt1"/>
+              </a:fontRef>
+            </p:style>
+            <p:txBody>
+              <a:bodyPr rtlCol="0" anchor="ctr"/>
+              <a:p>
+                <a:pPr algn="ctr"/>
+                <a:endParaRPr lang="en-US"/>
+              </a:p>
+            </p:txBody>
+          </p:sp>
+          <p:sp>
+            <p:nvSpPr>
+              <p:cNvPr id="39" name="Left Arrow 38"/>
+              <p:cNvSpPr/>
+              <p:nvPr/>
+            </p:nvSpPr>
+            <p:spPr>
+              <a:xfrm rot="2700000">
+                <a:off x="7452" y="4292"/>
+                <a:ext cx="1296" cy="144"/>
+              </a:xfrm>
+              <a:prstGeom prst="leftArrow">
+                <a:avLst/>
+              </a:prstGeom>
+              <a:solidFill>
+                <a:srgbClr val="7CE0D1"/>
+              </a:solidFill>
+              <a:ln>
+                <a:noFill/>
+              </a:ln>
+            </p:spPr>
+            <p:style>
+              <a:lnRef idx="2">
+                <a:schemeClr val="accent1">
+                  <a:shade val="50000"/>
+                </a:schemeClr>
+              </a:lnRef>
+              <a:fillRef idx="1">
+                <a:schemeClr val="accent1"/>
+              </a:fillRef>
+              <a:effectRef idx="0">
+                <a:schemeClr val="accent1"/>
+              </a:effectRef>
+              <a:fontRef idx="minor">
+                <a:schemeClr val="lt1"/>
+              </a:fontRef>
+            </p:style>
+            <p:txBody>
+              <a:bodyPr rtlCol="0" anchor="ctr"/>
+              <a:p>
+                <a:pPr algn="ctr"/>
+                <a:endParaRPr lang="en-US"/>
+              </a:p>
+            </p:txBody>
+          </p:sp>
+          <p:sp>
+            <p:nvSpPr>
+              <p:cNvPr id="40" name="Right Arrow 39"/>
+              <p:cNvSpPr/>
+              <p:nvPr/>
+            </p:nvSpPr>
+            <p:spPr>
+              <a:xfrm rot="2700000">
+                <a:off x="3680" y="2478"/>
+                <a:ext cx="1296" cy="144"/>
+              </a:xfrm>
+              <a:prstGeom prst="rightArrow">
+                <a:avLst/>
+              </a:prstGeom>
+              <a:solidFill>
+                <a:srgbClr val="F7D97B"/>
+              </a:solidFill>
+              <a:ln>
+                <a:noFill/>
+              </a:ln>
+            </p:spPr>
+            <p:style>
+              <a:lnRef idx="2">
+                <a:schemeClr val="accent1">
+                  <a:shade val="50000"/>
+                </a:schemeClr>
+              </a:lnRef>
+              <a:fillRef idx="1">
+                <a:schemeClr val="accent1"/>
+              </a:fillRef>
+              <a:effectRef idx="0">
+                <a:schemeClr val="accent1"/>
+              </a:effectRef>
+              <a:fontRef idx="minor">
+                <a:schemeClr val="lt1"/>
+              </a:fontRef>
+            </p:style>
+            <p:txBody>
+              <a:bodyPr rtlCol="0" anchor="ctr"/>
+              <a:p>
+                <a:pPr algn="ctr"/>
+                <a:endParaRPr lang="en-US"/>
+              </a:p>
+            </p:txBody>
+          </p:sp>
+          <p:sp>
+            <p:nvSpPr>
+              <p:cNvPr id="41" name="Right Arrow 40"/>
+              <p:cNvSpPr/>
+              <p:nvPr/>
+            </p:nvSpPr>
+            <p:spPr>
+              <a:xfrm rot="2700000">
+                <a:off x="5501" y="3023"/>
+                <a:ext cx="1296" cy="144"/>
+              </a:xfrm>
+              <a:prstGeom prst="rightArrow">
+                <a:avLst/>
+              </a:prstGeom>
+              <a:solidFill>
+                <a:srgbClr val="F7D97B"/>
+              </a:solidFill>
+              <a:ln>
+                <a:noFill/>
+              </a:ln>
+            </p:spPr>
+            <p:style>
+              <a:lnRef idx="2">
+                <a:schemeClr val="accent1">
+                  <a:shade val="50000"/>
+                </a:schemeClr>
+              </a:lnRef>
+              <a:fillRef idx="1">
+                <a:schemeClr val="accent1"/>
+              </a:fillRef>
+              <a:effectRef idx="0">
+                <a:schemeClr val="accent1"/>
+              </a:effectRef>
+              <a:fontRef idx="minor">
+                <a:schemeClr val="lt1"/>
+              </a:fontRef>
+            </p:style>
+            <p:txBody>
+              <a:bodyPr rtlCol="0" anchor="ctr"/>
+              <a:p>
+                <a:pPr algn="ctr"/>
+                <a:endParaRPr lang="en-US"/>
+              </a:p>
+            </p:txBody>
+          </p:sp>
+          <p:sp>
+            <p:nvSpPr>
+              <p:cNvPr id="42" name="Right Arrow 41"/>
+              <p:cNvSpPr/>
+              <p:nvPr/>
+            </p:nvSpPr>
+            <p:spPr>
+              <a:xfrm rot="2700000">
+                <a:off x="7532" y="4035"/>
+                <a:ext cx="1296" cy="144"/>
+              </a:xfrm>
+              <a:prstGeom prst="rightArrow">
+                <a:avLst/>
+              </a:prstGeom>
+              <a:solidFill>
+                <a:srgbClr val="F7D97B"/>
+              </a:solidFill>
+              <a:ln>
+                <a:noFill/>
+              </a:ln>
+            </p:spPr>
+            <p:style>
+              <a:lnRef idx="2">
+                <a:schemeClr val="accent1">
+                  <a:shade val="50000"/>
+                </a:schemeClr>
+              </a:lnRef>
+              <a:fillRef idx="1">
+                <a:schemeClr val="accent1"/>
+              </a:fillRef>
+              <a:effectRef idx="0">
+                <a:schemeClr val="accent1"/>
+              </a:effectRef>
+              <a:fontRef idx="minor">
+                <a:schemeClr val="lt1"/>
+              </a:fontRef>
+            </p:style>
+            <p:txBody>
+              <a:bodyPr rtlCol="0" anchor="ctr"/>
+              <a:p>
+                <a:pPr algn="ctr"/>
+                <a:endParaRPr lang="en-US"/>
+              </a:p>
+            </p:txBody>
+          </p:sp>
+          <p:cxnSp>
+            <p:nvCxnSpPr>
+              <p:cNvPr id="43" name="Straight Arrow Connector 42"/>
+              <p:cNvCxnSpPr/>
+              <p:nvPr/>
+            </p:nvCxnSpPr>
+            <p:spPr>
+              <a:xfrm flipV="1">
+                <a:off x="4904" y="2667"/>
+                <a:ext cx="0" cy="648"/>
+              </a:xfrm>
+              <a:prstGeom prst="straightConnector1">
+                <a:avLst/>
+              </a:prstGeom>
+              <a:ln w="57150">
+                <a:solidFill>
+                  <a:srgbClr val="00B050"/>
+                </a:solidFill>
+                <a:headEnd type="none" w="med" len="med"/>
+                <a:tailEnd type="triangle" w="med" len="med"/>
+              </a:ln>
+            </p:spPr>
+            <p:style>
+              <a:lnRef idx="1">
+                <a:schemeClr val="accent1"/>
+              </a:lnRef>
+              <a:fillRef idx="0">
+                <a:schemeClr val="accent1"/>
+              </a:fillRef>
+              <a:effectRef idx="0">
+                <a:schemeClr val="accent1"/>
+              </a:effectRef>
+              <a:fontRef idx="minor">
+                <a:schemeClr val="tx1"/>
+              </a:fontRef>
+            </p:style>
+          </p:cxnSp>
+          <p:cxnSp>
+            <p:nvCxnSpPr>
+              <p:cNvPr id="44" name="Straight Arrow Connector 43"/>
+              <p:cNvCxnSpPr/>
+              <p:nvPr/>
+            </p:nvCxnSpPr>
+            <p:spPr>
+              <a:xfrm flipV="1">
+                <a:off x="8764" y="4231"/>
+                <a:ext cx="0" cy="648"/>
+              </a:xfrm>
+              <a:prstGeom prst="straightConnector1">
+                <a:avLst/>
+              </a:prstGeom>
+              <a:ln w="57150">
+                <a:solidFill>
+                  <a:srgbClr val="00B050"/>
+                </a:solidFill>
+                <a:headEnd type="none" w="med" len="med"/>
+                <a:tailEnd type="triangle" w="med" len="med"/>
+              </a:ln>
+            </p:spPr>
+            <p:style>
+              <a:lnRef idx="1">
+                <a:schemeClr val="accent1"/>
+              </a:lnRef>
+              <a:fillRef idx="0">
+                <a:schemeClr val="accent1"/>
+              </a:fillRef>
+              <a:effectRef idx="0">
+                <a:schemeClr val="accent1"/>
+              </a:effectRef>
+              <a:fontRef idx="minor">
+                <a:schemeClr val="tx1"/>
+              </a:fontRef>
+            </p:style>
+          </p:cxnSp>
+          <p:sp>
+            <p:nvSpPr>
+              <p:cNvPr id="46" name="Text Box 45"/>
+              <p:cNvSpPr txBox="1"/>
+              <p:nvPr/>
+            </p:nvSpPr>
+            <p:spPr>
+              <a:xfrm>
+                <a:off x="2637" y="2787"/>
+                <a:ext cx="1617" cy="246"/>
+              </a:xfrm>
+              <a:prstGeom prst="rect">
+                <a:avLst/>
+              </a:prstGeom>
               <a:noFill/>
-            </a:ln>
-          </p:spPr>
-          <p:style>
-            <a:lnRef idx="2">
-              <a:schemeClr val="accent1">
-                <a:shade val="50000"/>
-              </a:schemeClr>
-            </a:lnRef>
-            <a:fillRef idx="1">
-              <a:schemeClr val="accent1"/>
-            </a:fillRef>
-            <a:effectRef idx="0">
-              <a:schemeClr val="accent1"/>
-            </a:effectRef>
-            <a:fontRef idx="minor">
-              <a:schemeClr val="lt1"/>
-            </a:fontRef>
-          </p:style>
-          <p:txBody>
-            <a:bodyPr rtlCol="0" anchor="ctr"/>
-            <a:p>
-              <a:pPr algn="ctr"/>
-              <a:endParaRPr lang="en-US"/>
-            </a:p>
-          </p:txBody>
-        </p:sp>
-        <p:sp>
-          <p:nvSpPr>
-            <p:cNvPr id="38" name="Left Arrow 37"/>
-            <p:cNvSpPr/>
-            <p:nvPr/>
-          </p:nvSpPr>
-          <p:spPr>
-            <a:xfrm rot="2700000">
-              <a:off x="5421" y="3280"/>
-              <a:ext cx="1296" cy="144"/>
-            </a:xfrm>
-            <a:prstGeom prst="leftArrow">
-              <a:avLst/>
-            </a:prstGeom>
-            <a:solidFill>
-              <a:srgbClr val="7CE0D1"/>
-            </a:solidFill>
-            <a:ln>
-              <a:noFill/>
-            </a:ln>
-          </p:spPr>
-          <p:style>
-            <a:lnRef idx="2">
-              <a:schemeClr val="accent1">
-                <a:shade val="50000"/>
-              </a:schemeClr>
-            </a:lnRef>
-            <a:fillRef idx="1">
-              <a:schemeClr val="accent1"/>
-            </a:fillRef>
-            <a:effectRef idx="0">
-              <a:schemeClr val="accent1"/>
-            </a:effectRef>
-            <a:fontRef idx="minor">
-              <a:schemeClr val="lt1"/>
-            </a:fontRef>
-          </p:style>
-          <p:txBody>
-            <a:bodyPr rtlCol="0" anchor="ctr"/>
-            <a:p>
-              <a:pPr algn="ctr"/>
-              <a:endParaRPr lang="en-US"/>
-            </a:p>
-          </p:txBody>
-        </p:sp>
-        <p:sp>
-          <p:nvSpPr>
-            <p:cNvPr id="39" name="Left Arrow 38"/>
-            <p:cNvSpPr/>
-            <p:nvPr/>
-          </p:nvSpPr>
-          <p:spPr>
-            <a:xfrm rot="2700000">
-              <a:off x="7452" y="4292"/>
-              <a:ext cx="1296" cy="144"/>
-            </a:xfrm>
-            <a:prstGeom prst="leftArrow">
-              <a:avLst/>
-            </a:prstGeom>
-            <a:solidFill>
-              <a:srgbClr val="7CE0D1"/>
-            </a:solidFill>
-            <a:ln>
-              <a:noFill/>
-            </a:ln>
-          </p:spPr>
-          <p:style>
-            <a:lnRef idx="2">
-              <a:schemeClr val="accent1">
-                <a:shade val="50000"/>
-              </a:schemeClr>
-            </a:lnRef>
-            <a:fillRef idx="1">
-              <a:schemeClr val="accent1"/>
-            </a:fillRef>
-            <a:effectRef idx="0">
-              <a:schemeClr val="accent1"/>
-            </a:effectRef>
-            <a:fontRef idx="minor">
-              <a:schemeClr val="lt1"/>
-            </a:fontRef>
-          </p:style>
-          <p:txBody>
-            <a:bodyPr rtlCol="0" anchor="ctr"/>
-            <a:p>
-              <a:pPr algn="ctr"/>
-              <a:endParaRPr lang="en-US"/>
-            </a:p>
-          </p:txBody>
-        </p:sp>
-        <p:sp>
-          <p:nvSpPr>
-            <p:cNvPr id="40" name="Right Arrow 39"/>
-            <p:cNvSpPr/>
-            <p:nvPr/>
-          </p:nvSpPr>
-          <p:spPr>
-            <a:xfrm rot="2700000">
-              <a:off x="3680" y="2478"/>
-              <a:ext cx="1296" cy="144"/>
-            </a:xfrm>
-            <a:prstGeom prst="rightArrow">
-              <a:avLst/>
-            </a:prstGeom>
-            <a:solidFill>
-              <a:srgbClr val="F7D97B"/>
-            </a:solidFill>
-            <a:ln>
-              <a:noFill/>
-            </a:ln>
-          </p:spPr>
-          <p:style>
-            <a:lnRef idx="2">
-              <a:schemeClr val="accent1">
-                <a:shade val="50000"/>
-              </a:schemeClr>
-            </a:lnRef>
-            <a:fillRef idx="1">
-              <a:schemeClr val="accent1"/>
-            </a:fillRef>
-            <a:effectRef idx="0">
-              <a:schemeClr val="accent1"/>
-            </a:effectRef>
-            <a:fontRef idx="minor">
-              <a:schemeClr val="lt1"/>
-            </a:fontRef>
-          </p:style>
-          <p:txBody>
-            <a:bodyPr rtlCol="0" anchor="ctr"/>
-            <a:p>
-              <a:pPr algn="ctr"/>
-              <a:endParaRPr lang="en-US"/>
-            </a:p>
-          </p:txBody>
-        </p:sp>
-        <p:sp>
-          <p:nvSpPr>
-            <p:cNvPr id="41" name="Right Arrow 40"/>
-            <p:cNvSpPr/>
-            <p:nvPr/>
-          </p:nvSpPr>
-          <p:spPr>
-            <a:xfrm rot="2700000">
-              <a:off x="5501" y="3023"/>
-              <a:ext cx="1296" cy="144"/>
-            </a:xfrm>
-            <a:prstGeom prst="rightArrow">
-              <a:avLst/>
-            </a:prstGeom>
-            <a:solidFill>
-              <a:srgbClr val="F7D97B"/>
-            </a:solidFill>
-            <a:ln>
-              <a:noFill/>
-            </a:ln>
-          </p:spPr>
-          <p:style>
-            <a:lnRef idx="2">
-              <a:schemeClr val="accent1">
-                <a:shade val="50000"/>
-              </a:schemeClr>
-            </a:lnRef>
-            <a:fillRef idx="1">
-              <a:schemeClr val="accent1"/>
-            </a:fillRef>
-            <a:effectRef idx="0">
-              <a:schemeClr val="accent1"/>
-            </a:effectRef>
-            <a:fontRef idx="minor">
-              <a:schemeClr val="lt1"/>
-            </a:fontRef>
-          </p:style>
-          <p:txBody>
-            <a:bodyPr rtlCol="0" anchor="ctr"/>
-            <a:p>
-              <a:pPr algn="ctr"/>
-              <a:endParaRPr lang="en-US"/>
-            </a:p>
-          </p:txBody>
-        </p:sp>
-        <p:sp>
-          <p:nvSpPr>
-            <p:cNvPr id="42" name="Right Arrow 41"/>
-            <p:cNvSpPr/>
-            <p:nvPr/>
-          </p:nvSpPr>
-          <p:spPr>
-            <a:xfrm rot="2700000">
-              <a:off x="7532" y="4035"/>
-              <a:ext cx="1296" cy="144"/>
-            </a:xfrm>
-            <a:prstGeom prst="rightArrow">
-              <a:avLst/>
-            </a:prstGeom>
-            <a:solidFill>
-              <a:srgbClr val="F7D97B"/>
-            </a:solidFill>
-            <a:ln>
-              <a:noFill/>
-            </a:ln>
-          </p:spPr>
-          <p:style>
-            <a:lnRef idx="2">
-              <a:schemeClr val="accent1">
-                <a:shade val="50000"/>
-              </a:schemeClr>
-            </a:lnRef>
-            <a:fillRef idx="1">
-              <a:schemeClr val="accent1"/>
-            </a:fillRef>
-            <a:effectRef idx="0">
-              <a:schemeClr val="accent1"/>
-            </a:effectRef>
-            <a:fontRef idx="minor">
-              <a:schemeClr val="lt1"/>
-            </a:fontRef>
-          </p:style>
-          <p:txBody>
-            <a:bodyPr rtlCol="0" anchor="ctr"/>
-            <a:p>
-              <a:pPr algn="ctr"/>
-              <a:endParaRPr lang="en-US"/>
-            </a:p>
-          </p:txBody>
-        </p:sp>
-        <p:cxnSp>
-          <p:nvCxnSpPr>
-            <p:cNvPr id="43" name="Straight Arrow Connector 42"/>
-            <p:cNvCxnSpPr/>
-            <p:nvPr/>
-          </p:nvCxnSpPr>
-          <p:spPr>
-            <a:xfrm flipV="1">
-              <a:off x="4904" y="2667"/>
-              <a:ext cx="0" cy="648"/>
-            </a:xfrm>
-            <a:prstGeom prst="straightConnector1">
-              <a:avLst/>
-            </a:prstGeom>
-            <a:ln w="57150">
-              <a:solidFill>
-                <a:srgbClr val="00B050"/>
-              </a:solidFill>
-              <a:headEnd type="none" w="med" len="med"/>
-              <a:tailEnd type="triangle" w="med" len="med"/>
-            </a:ln>
-          </p:spPr>
-          <p:style>
-            <a:lnRef idx="1">
-              <a:schemeClr val="accent1"/>
-            </a:lnRef>
-            <a:fillRef idx="0">
-              <a:schemeClr val="accent1"/>
-            </a:fillRef>
-            <a:effectRef idx="0">
-              <a:schemeClr val="accent1"/>
-            </a:effectRef>
-            <a:fontRef idx="minor">
-              <a:schemeClr val="tx1"/>
-            </a:fontRef>
-          </p:style>
-        </p:cxnSp>
-        <p:cxnSp>
-          <p:nvCxnSpPr>
-            <p:cNvPr id="44" name="Straight Arrow Connector 43"/>
-            <p:cNvCxnSpPr/>
-            <p:nvPr/>
-          </p:nvCxnSpPr>
-          <p:spPr>
-            <a:xfrm flipV="1">
-              <a:off x="8764" y="4231"/>
-              <a:ext cx="0" cy="648"/>
-            </a:xfrm>
-            <a:prstGeom prst="straightConnector1">
-              <a:avLst/>
-            </a:prstGeom>
-            <a:ln w="57150">
-              <a:solidFill>
-                <a:srgbClr val="00B050"/>
-              </a:solidFill>
-              <a:headEnd type="none" w="med" len="med"/>
-              <a:tailEnd type="triangle" w="med" len="med"/>
-            </a:ln>
-          </p:spPr>
-          <p:style>
-            <a:lnRef idx="1">
-              <a:schemeClr val="accent1"/>
-            </a:lnRef>
-            <a:fillRef idx="0">
-              <a:schemeClr val="accent1"/>
-            </a:fillRef>
-            <a:effectRef idx="0">
-              <a:schemeClr val="accent1"/>
-            </a:effectRef>
-            <a:fontRef idx="minor">
-              <a:schemeClr val="tx1"/>
-            </a:fontRef>
-          </p:style>
-        </p:cxnSp>
-        <p:sp>
-          <p:nvSpPr>
-            <p:cNvPr id="46" name="Text Box 45"/>
-            <p:cNvSpPr txBox="1"/>
-            <p:nvPr/>
-          </p:nvSpPr>
-          <p:spPr>
-            <a:xfrm>
-              <a:off x="2637" y="2787"/>
-              <a:ext cx="1617" cy="246"/>
-            </a:xfrm>
-            <a:prstGeom prst="rect">
-              <a:avLst/>
-            </a:prstGeom>
-            <a:noFill/>
-          </p:spPr>
-          <p:txBody>
-            <a:bodyPr wrap="square" rtlCol="0">
-              <a:spAutoFit/>
-            </a:bodyPr>
-            <a:p>
-              <a:pPr algn="ctr"/>
-              <a:r>
-                <a:rPr lang="" altLang="en-US" sz="1400">
+            </p:spPr>
+            <p:txBody>
+              <a:bodyPr wrap="square" rtlCol="0">
+                <a:spAutoFit/>
+              </a:bodyPr>
+              <a:p>
+                <a:pPr algn="ctr"/>
+                <a:r>
+                  <a:rPr lang="en-US" altLang="en-US" sz="1400">
+                    <a:solidFill>
+                      <a:schemeClr val="bg1">
+                        <a:lumMod val="85000"/>
+                      </a:schemeClr>
+                    </a:solidFill>
+                    <a:latin typeface="Liberation Mono" panose="02070409020205020404" charset="0"/>
+                    <a:cs typeface="Liberation Mono" panose="02070409020205020404" charset="0"/>
+                  </a:rPr>
+                  <a:t>Reservior 1</a:t>
+                </a:r>
+                <a:endParaRPr lang="en-US" altLang="en-US" sz="1400">
                   <a:solidFill>
                     <a:schemeClr val="bg1">
                       <a:lumMod val="85000"/>
@@ -5098,45 +5123,45 @@
                   </a:solidFill>
                   <a:latin typeface="Liberation Mono" panose="02070409020205020404" charset="0"/>
                   <a:cs typeface="Liberation Mono" panose="02070409020205020404" charset="0"/>
-                </a:rPr>
-                <a:t>Reservior 1</a:t>
-              </a:r>
-              <a:endParaRPr lang="" altLang="en-US" sz="1400">
-                <a:solidFill>
-                  <a:schemeClr val="bg1">
-                    <a:lumMod val="85000"/>
-                  </a:schemeClr>
-                </a:solidFill>
-                <a:latin typeface="Liberation Mono" panose="02070409020205020404" charset="0"/>
-                <a:cs typeface="Liberation Mono" panose="02070409020205020404" charset="0"/>
-              </a:endParaRPr>
-            </a:p>
-          </p:txBody>
-        </p:sp>
-        <p:sp>
-          <p:nvSpPr>
-            <p:cNvPr id="47" name="Text Box 46"/>
-            <p:cNvSpPr txBox="1"/>
-            <p:nvPr/>
-          </p:nvSpPr>
-          <p:spPr>
-            <a:xfrm>
-              <a:off x="4436" y="3315"/>
-              <a:ext cx="1617" cy="246"/>
-            </a:xfrm>
-            <a:prstGeom prst="rect">
-              <a:avLst/>
-            </a:prstGeom>
-            <a:noFill/>
-          </p:spPr>
-          <p:txBody>
-            <a:bodyPr wrap="square" rtlCol="0">
-              <a:spAutoFit/>
-            </a:bodyPr>
-            <a:p>
-              <a:pPr algn="ctr"/>
-              <a:r>
-                <a:rPr lang="en-US" altLang="en-US" sz="1400">
+                </a:endParaRPr>
+              </a:p>
+            </p:txBody>
+          </p:sp>
+          <p:sp>
+            <p:nvSpPr>
+              <p:cNvPr id="47" name="Text Box 46"/>
+              <p:cNvSpPr txBox="1"/>
+              <p:nvPr/>
+            </p:nvSpPr>
+            <p:spPr>
+              <a:xfrm>
+                <a:off x="4436" y="3315"/>
+                <a:ext cx="1617" cy="246"/>
+              </a:xfrm>
+              <a:prstGeom prst="rect">
+                <a:avLst/>
+              </a:prstGeom>
+              <a:noFill/>
+            </p:spPr>
+            <p:txBody>
+              <a:bodyPr wrap="square" rtlCol="0">
+                <a:spAutoFit/>
+              </a:bodyPr>
+              <a:p>
+                <a:pPr algn="ctr"/>
+                <a:r>
+                  <a:rPr lang="en-US" altLang="en-US" sz="1400">
+                    <a:solidFill>
+                      <a:schemeClr val="bg1">
+                        <a:lumMod val="85000"/>
+                      </a:schemeClr>
+                    </a:solidFill>
+                    <a:latin typeface="Liberation Mono" panose="02070409020205020404" charset="0"/>
+                    <a:cs typeface="Liberation Mono" panose="02070409020205020404" charset="0"/>
+                  </a:rPr>
+                  <a:t>Reservior 2</a:t>
+                </a:r>
+                <a:endParaRPr lang="en-US" altLang="en-US" sz="1400">
                   <a:solidFill>
                     <a:schemeClr val="bg1">
                       <a:lumMod val="85000"/>
@@ -5144,11 +5169,45 @@
                   </a:solidFill>
                   <a:latin typeface="Liberation Mono" panose="02070409020205020404" charset="0"/>
                   <a:cs typeface="Liberation Mono" panose="02070409020205020404" charset="0"/>
-                </a:rPr>
-                <a:t>Reservior </a:t>
-              </a:r>
-              <a:r>
-                <a:rPr lang="" altLang="en-US" sz="1400">
+                </a:endParaRPr>
+              </a:p>
+            </p:txBody>
+          </p:sp>
+          <p:sp>
+            <p:nvSpPr>
+              <p:cNvPr id="48" name="Text Box 47"/>
+              <p:cNvSpPr txBox="1"/>
+              <p:nvPr/>
+            </p:nvSpPr>
+            <p:spPr>
+              <a:xfrm>
+                <a:off x="8288" y="4879"/>
+                <a:ext cx="1617" cy="246"/>
+              </a:xfrm>
+              <a:prstGeom prst="rect">
+                <a:avLst/>
+              </a:prstGeom>
+              <a:noFill/>
+            </p:spPr>
+            <p:txBody>
+              <a:bodyPr wrap="square" rtlCol="0">
+                <a:spAutoFit/>
+              </a:bodyPr>
+              <a:p>
+                <a:pPr algn="ctr"/>
+                <a:r>
+                  <a:rPr lang="en-US" altLang="en-US" sz="1400">
+                    <a:solidFill>
+                      <a:schemeClr val="bg1">
+                        <a:lumMod val="85000"/>
+                      </a:schemeClr>
+                    </a:solidFill>
+                    <a:latin typeface="Liberation Mono" panose="02070409020205020404" charset="0"/>
+                    <a:cs typeface="Liberation Mono" panose="02070409020205020404" charset="0"/>
+                  </a:rPr>
+                  <a:t>Reservior N</a:t>
+                </a:r>
+                <a:endParaRPr lang="en-US" altLang="en-US" sz="1400">
                   <a:solidFill>
                     <a:schemeClr val="bg1">
                       <a:lumMod val="85000"/>
@@ -5156,200 +5215,177 @@
                   </a:solidFill>
                   <a:latin typeface="Liberation Mono" panose="02070409020205020404" charset="0"/>
                   <a:cs typeface="Liberation Mono" panose="02070409020205020404" charset="0"/>
-                </a:rPr>
-                <a:t>2</a:t>
-              </a:r>
-              <a:endParaRPr lang="" altLang="en-US" sz="1400">
-                <a:solidFill>
-                  <a:schemeClr val="bg1">
-                    <a:lumMod val="85000"/>
-                  </a:schemeClr>
-                </a:solidFill>
-                <a:latin typeface="Liberation Mono" panose="02070409020205020404" charset="0"/>
-                <a:cs typeface="Liberation Mono" panose="02070409020205020404" charset="0"/>
-              </a:endParaRPr>
-            </a:p>
-          </p:txBody>
-        </p:sp>
-        <p:sp>
-          <p:nvSpPr>
-            <p:cNvPr id="48" name="Text Box 47"/>
-            <p:cNvSpPr txBox="1"/>
-            <p:nvPr/>
-          </p:nvSpPr>
-          <p:spPr>
-            <a:xfrm>
-              <a:off x="8288" y="4879"/>
-              <a:ext cx="1617" cy="246"/>
-            </a:xfrm>
-            <a:prstGeom prst="rect">
-              <a:avLst/>
-            </a:prstGeom>
-            <a:noFill/>
-          </p:spPr>
-          <p:txBody>
-            <a:bodyPr wrap="square" rtlCol="0">
-              <a:spAutoFit/>
-            </a:bodyPr>
-            <a:p>
-              <a:pPr algn="ctr"/>
-              <a:r>
-                <a:rPr lang="en-US" altLang="en-US" sz="1400">
-                  <a:solidFill>
-                    <a:schemeClr val="bg1">
-                      <a:lumMod val="85000"/>
-                    </a:schemeClr>
-                  </a:solidFill>
+                </a:endParaRPr>
+              </a:p>
+            </p:txBody>
+          </p:sp>
+          <p:sp>
+            <p:nvSpPr>
+              <p:cNvPr id="49" name="Text Box 48"/>
+              <p:cNvSpPr txBox="1"/>
+              <p:nvPr/>
+            </p:nvSpPr>
+            <p:spPr>
+              <a:xfrm>
+                <a:off x="6759" y="1380"/>
+                <a:ext cx="3598" cy="1061"/>
+              </a:xfrm>
+              <a:prstGeom prst="rect">
+                <a:avLst/>
+              </a:prstGeom>
+              <a:noFill/>
+            </p:spPr>
+            <p:txBody>
+              <a:bodyPr wrap="square" rtlCol="0">
+                <a:spAutoFit/>
+              </a:bodyPr>
+              <a:p>
+                <a:pPr algn="ctr"/>
+                <a:r>
+                  <a:rPr lang="en-US" altLang="en-US" sz="2000">
+                    <a:solidFill>
+                      <a:srgbClr val="00B050"/>
+                    </a:solidFill>
+                    <a:latin typeface="Liberation Mono" panose="02070409020205020404" charset="0"/>
+                    <a:cs typeface="Liberation Mono" panose="02070409020205020404" charset="0"/>
+                  </a:rPr>
+                  <a:t>Level (State)</a:t>
+                </a:r>
+                <a:endParaRPr lang="en-US" altLang="en-US" sz="2000">
                   <a:latin typeface="Liberation Mono" panose="02070409020205020404" charset="0"/>
                   <a:cs typeface="Liberation Mono" panose="02070409020205020404" charset="0"/>
-                </a:rPr>
-                <a:t>Reservior </a:t>
-              </a:r>
-              <a:r>
-                <a:rPr lang="" altLang="en-US" sz="1400">
-                  <a:solidFill>
-                    <a:schemeClr val="bg1">
-                      <a:lumMod val="85000"/>
-                    </a:schemeClr>
-                  </a:solidFill>
+                </a:endParaRPr>
+              </a:p>
+              <a:p>
+                <a:pPr algn="ctr"/>
+                <a:r>
+                  <a:rPr lang="en-US" altLang="en-US" sz="2000">
+                    <a:solidFill>
+                      <a:srgbClr val="FD0062"/>
+                    </a:solidFill>
+                    <a:latin typeface="Liberation Mono" panose="02070409020205020404" charset="0"/>
+                    <a:cs typeface="Liberation Mono" panose="02070409020205020404" charset="0"/>
+                  </a:rPr>
+                  <a:t>Rainfall (Exogenous)</a:t>
+                </a:r>
+                <a:endParaRPr lang="en-US" altLang="en-US" sz="2000">
                   <a:latin typeface="Liberation Mono" panose="02070409020205020404" charset="0"/>
                   <a:cs typeface="Liberation Mono" panose="02070409020205020404" charset="0"/>
-                </a:rPr>
-                <a:t>N</a:t>
-              </a:r>
-              <a:endParaRPr lang="" altLang="en-US" sz="1400">
-                <a:solidFill>
-                  <a:schemeClr val="bg1">
-                    <a:lumMod val="85000"/>
-                  </a:schemeClr>
-                </a:solidFill>
-                <a:latin typeface="Liberation Mono" panose="02070409020205020404" charset="0"/>
-                <a:cs typeface="Liberation Mono" panose="02070409020205020404" charset="0"/>
-              </a:endParaRPr>
-            </a:p>
-          </p:txBody>
-        </p:sp>
-        <p:sp>
-          <p:nvSpPr>
-            <p:cNvPr id="49" name="Text Box 48"/>
-            <p:cNvSpPr txBox="1"/>
-            <p:nvPr/>
-          </p:nvSpPr>
-          <p:spPr>
-            <a:xfrm>
-              <a:off x="6759" y="1380"/>
-              <a:ext cx="3598" cy="1061"/>
-            </a:xfrm>
-            <a:prstGeom prst="rect">
-              <a:avLst/>
-            </a:prstGeom>
-            <a:noFill/>
-          </p:spPr>
-          <p:txBody>
-            <a:bodyPr wrap="square" rtlCol="0">
-              <a:spAutoFit/>
-            </a:bodyPr>
-            <a:p>
-              <a:pPr algn="ctr"/>
-              <a:r>
-                <a:rPr lang="" altLang="en-US" sz="2000">
-                  <a:solidFill>
-                    <a:srgbClr val="00B050"/>
-                  </a:solidFill>
+                </a:endParaRPr>
+              </a:p>
+              <a:p>
+                <a:pPr algn="ctr"/>
+                <a:r>
+                  <a:rPr lang="en-US" altLang="en-US" sz="2000">
+                    <a:solidFill>
+                      <a:srgbClr val="F7D97B"/>
+                    </a:solidFill>
+                    <a:latin typeface="Liberation Mono" panose="02070409020205020404" charset="0"/>
+                    <a:cs typeface="Liberation Mono" panose="02070409020205020404" charset="0"/>
+                  </a:rPr>
+                  <a:t>Release (Control)</a:t>
+                </a:r>
+                <a:endParaRPr lang="en-US" altLang="en-US" sz="2000">
                   <a:latin typeface="Liberation Mono" panose="02070409020205020404" charset="0"/>
                   <a:cs typeface="Liberation Mono" panose="02070409020205020404" charset="0"/>
-                </a:rPr>
-                <a:t>Level (State)</a:t>
-              </a:r>
-              <a:endParaRPr lang="" altLang="en-US" sz="2000">
-                <a:latin typeface="Liberation Mono" panose="02070409020205020404" charset="0"/>
-                <a:cs typeface="Liberation Mono" panose="02070409020205020404" charset="0"/>
-              </a:endParaRPr>
-            </a:p>
-            <a:p>
-              <a:pPr algn="ctr"/>
-              <a:r>
-                <a:rPr lang="" altLang="en-US" sz="2000">
-                  <a:solidFill>
-                    <a:srgbClr val="FD0062"/>
-                  </a:solidFill>
-                  <a:latin typeface="Liberation Mono" panose="02070409020205020404" charset="0"/>
-                  <a:cs typeface="Liberation Mono" panose="02070409020205020404" charset="0"/>
-                </a:rPr>
-                <a:t>Rainfall (Exogenous)</a:t>
-              </a:r>
-              <a:endParaRPr lang="" altLang="en-US" sz="2000">
-                <a:latin typeface="Liberation Mono" panose="02070409020205020404" charset="0"/>
-                <a:cs typeface="Liberation Mono" panose="02070409020205020404" charset="0"/>
-              </a:endParaRPr>
-            </a:p>
-            <a:p>
-              <a:pPr algn="ctr"/>
-              <a:r>
-                <a:rPr lang="" altLang="en-US" sz="2000">
-                  <a:solidFill>
-                    <a:srgbClr val="F7D97B"/>
-                  </a:solidFill>
-                  <a:latin typeface="Liberation Mono" panose="02070409020205020404" charset="0"/>
-                  <a:cs typeface="Liberation Mono" panose="02070409020205020404" charset="0"/>
-                </a:rPr>
-                <a:t>Release (Control)</a:t>
-              </a:r>
-              <a:endParaRPr lang="" altLang="en-US" sz="2000">
-                <a:latin typeface="Liberation Mono" panose="02070409020205020404" charset="0"/>
-                <a:cs typeface="Liberation Mono" panose="02070409020205020404" charset="0"/>
-              </a:endParaRPr>
-            </a:p>
-            <a:p>
-              <a:pPr algn="ctr"/>
-              <a:r>
-                <a:rPr lang="" altLang="en-US" sz="2000">
-                  <a:solidFill>
-                    <a:srgbClr val="7CE0D1"/>
-                  </a:solidFill>
-                  <a:latin typeface="Liberation Mono" panose="02070409020205020404" charset="0"/>
-                  <a:cs typeface="Liberation Mono" panose="02070409020205020404" charset="0"/>
-                </a:rPr>
-                <a:t>Pumping </a:t>
-              </a:r>
-              <a:r>
-                <a:rPr lang="en-US" altLang="en-US" sz="2000">
+                </a:endParaRPr>
+              </a:p>
+              <a:p>
+                <a:pPr algn="ctr"/>
+                <a:r>
+                  <a:rPr lang="en-US" altLang="en-US" sz="2000">
+                    <a:solidFill>
+                      <a:srgbClr val="7CE0D1"/>
+                    </a:solidFill>
+                    <a:latin typeface="Liberation Mono" panose="02070409020205020404" charset="0"/>
+                    <a:cs typeface="Liberation Mono" panose="02070409020205020404" charset="0"/>
+                  </a:rPr>
+                  <a:t>Pumping </a:t>
+                </a:r>
+                <a:r>
+                  <a:rPr lang="en-US" altLang="en-US" sz="2000">
+                    <a:solidFill>
+                      <a:srgbClr val="7CE0D1"/>
+                    </a:solidFill>
+                    <a:latin typeface="Liberation Mono" panose="02070409020205020404" charset="0"/>
+                    <a:cs typeface="Liberation Mono" panose="02070409020205020404" charset="0"/>
+                    <a:sym typeface="+mn-ea"/>
+                  </a:rPr>
+                  <a:t>(Control)</a:t>
+                </a:r>
+                <a:endParaRPr lang="en-US" altLang="en-US" sz="2000">
                   <a:solidFill>
                     <a:srgbClr val="7CE0D1"/>
                   </a:solidFill>
                   <a:latin typeface="Liberation Mono" panose="02070409020205020404" charset="0"/>
                   <a:cs typeface="Liberation Mono" panose="02070409020205020404" charset="0"/>
                   <a:sym typeface="+mn-ea"/>
-                </a:rPr>
-                <a:t>(Control)</a:t>
-              </a:r>
-              <a:endParaRPr lang="en-US" altLang="en-US" sz="2000">
-                <a:solidFill>
-                  <a:srgbClr val="7CE0D1"/>
-                </a:solidFill>
-                <a:latin typeface="Liberation Mono" panose="02070409020205020404" charset="0"/>
-                <a:cs typeface="Liberation Mono" panose="02070409020205020404" charset="0"/>
-                <a:sym typeface="+mn-ea"/>
-              </a:endParaRPr>
-            </a:p>
-          </p:txBody>
-        </p:sp>
+                </a:endParaRPr>
+              </a:p>
+            </p:txBody>
+          </p:sp>
+          <p:sp>
+            <p:nvSpPr>
+              <p:cNvPr id="50" name="Right Arrow 49"/>
+              <p:cNvSpPr/>
+              <p:nvPr/>
+            </p:nvSpPr>
+            <p:spPr>
+              <a:xfrm rot="2700000">
+                <a:off x="9360" y="4580"/>
+                <a:ext cx="1296" cy="144"/>
+              </a:xfrm>
+              <a:prstGeom prst="rightArrow">
+                <a:avLst/>
+              </a:prstGeom>
+              <a:solidFill>
+                <a:srgbClr val="F7D97B"/>
+              </a:solidFill>
+              <a:ln>
+                <a:noFill/>
+              </a:ln>
+            </p:spPr>
+            <p:style>
+              <a:lnRef idx="2">
+                <a:schemeClr val="accent1">
+                  <a:shade val="50000"/>
+                </a:schemeClr>
+              </a:lnRef>
+              <a:fillRef idx="1">
+                <a:schemeClr val="accent1"/>
+              </a:fillRef>
+              <a:effectRef idx="0">
+                <a:schemeClr val="accent1"/>
+              </a:effectRef>
+              <a:fontRef idx="minor">
+                <a:schemeClr val="lt1"/>
+              </a:fontRef>
+            </p:style>
+            <p:txBody>
+              <a:bodyPr rtlCol="0" anchor="ctr"/>
+              <a:p>
+                <a:pPr algn="ctr"/>
+                <a:endParaRPr lang="en-US"/>
+              </a:p>
+            </p:txBody>
+          </p:sp>
+        </p:grpSp>
         <p:sp>
           <p:nvSpPr>
-            <p:cNvPr id="50" name="Right Arrow 49"/>
+            <p:cNvPr id="2" name="Left Arrow 1"/>
             <p:cNvSpPr/>
             <p:nvPr/>
           </p:nvSpPr>
           <p:spPr>
             <a:xfrm rot="2700000">
-              <a:off x="9360" y="4580"/>
-              <a:ext cx="1296" cy="144"/>
+              <a:off x="13357" y="8483"/>
+              <a:ext cx="2544" cy="235"/>
             </a:xfrm>
-            <a:prstGeom prst="rightArrow">
+            <a:prstGeom prst="leftArrow">
               <a:avLst/>
             </a:prstGeom>
             <a:solidFill>
-              <a:srgbClr val="F7D97B"/>
+              <a:srgbClr val="7CE0D1"/>
             </a:solidFill>
             <a:ln>
               <a:noFill/>

</xml_diff>